<commit_message>
updaed ppt and formatting files
</commit_message>
<xml_diff>
--- a/doc/Kafka-Streams-TechConf [Autosaved].pptx
+++ b/doc/Kafka-Streams-TechConf [Autosaved].pptx
@@ -5,7 +5,7 @@
     <p:sldMasterId id="2147483648" r:id="rId1"/>
   </p:sldMasterIdLst>
   <p:notesMasterIdLst>
-    <p:notesMasterId r:id="rId16"/>
+    <p:notesMasterId r:id="rId21"/>
   </p:notesMasterIdLst>
   <p:sldIdLst>
     <p:sldId id="256" r:id="rId2"/>
@@ -14,14 +14,19 @@
     <p:sldId id="260" r:id="rId5"/>
     <p:sldId id="276" r:id="rId6"/>
     <p:sldId id="275" r:id="rId7"/>
-    <p:sldId id="258" r:id="rId8"/>
-    <p:sldId id="264" r:id="rId9"/>
-    <p:sldId id="266" r:id="rId10"/>
-    <p:sldId id="270" r:id="rId11"/>
-    <p:sldId id="267" r:id="rId12"/>
-    <p:sldId id="278" r:id="rId13"/>
-    <p:sldId id="274" r:id="rId14"/>
-    <p:sldId id="277" r:id="rId15"/>
+    <p:sldId id="281" r:id="rId8"/>
+    <p:sldId id="282" r:id="rId9"/>
+    <p:sldId id="283" r:id="rId10"/>
+    <p:sldId id="258" r:id="rId11"/>
+    <p:sldId id="264" r:id="rId12"/>
+    <p:sldId id="266" r:id="rId13"/>
+    <p:sldId id="267" r:id="rId14"/>
+    <p:sldId id="270" r:id="rId15"/>
+    <p:sldId id="279" r:id="rId16"/>
+    <p:sldId id="280" r:id="rId17"/>
+    <p:sldId id="278" r:id="rId18"/>
+    <p:sldId id="274" r:id="rId19"/>
+    <p:sldId id="277" r:id="rId20"/>
   </p:sldIdLst>
   <p:sldSz cx="12192000" cy="6858000"/>
   <p:notesSz cx="9144000" cy="6858000"/>
@@ -3432,7 +3437,7 @@
         <p:spPr>
           <a:xfrm>
             <a:off x="1229523" y="548641"/>
-            <a:ext cx="9377517" cy="4602480"/>
+            <a:ext cx="9811010" cy="5008230"/>
           </a:xfrm>
         </p:spPr>
         <p:txBody>
@@ -3441,7 +3446,7 @@
           </a:bodyPr>
           <a:lstStyle/>
           <a:p>
-            <a:endParaRPr lang="en-US" sz="4800" dirty="0" smtClean="0"/>
+            <a:endParaRPr lang="en-US" sz="4800" dirty="0"/>
           </a:p>
           <a:p>
             <a:r>
@@ -3555,7 +3560,7 @@
         </p:blipFill>
         <p:spPr>
           <a:xfrm>
-            <a:off x="4269741" y="2973303"/>
+            <a:off x="4269741" y="3024102"/>
             <a:ext cx="3563619" cy="2185447"/>
           </a:xfrm>
           <a:prstGeom prst="rect">
@@ -3620,8 +3625,12 @@
               <a:t>Binita </a:t>
             </a:r>
             <a:r>
-              <a:rPr lang="en-US" sz="2000" dirty="0" err="1" smtClean="0"/>
-              <a:t>kaushik</a:t>
+              <a:rPr lang="en-US" sz="2000" dirty="0"/>
+              <a:t>K</a:t>
+            </a:r>
+            <a:r>
+              <a:rPr lang="en-US" sz="2000" dirty="0" smtClean="0"/>
+              <a:t>aushik</a:t>
             </a:r>
             <a:endParaRPr lang="en-US" sz="2000" dirty="0"/>
           </a:p>
@@ -3681,26 +3690,96 @@
           <a:p>
             <a:r>
               <a:rPr lang="en-US" dirty="0" smtClean="0"/>
-              <a:t>Demo masking PII Streams </a:t>
-            </a:r>
+              <a:t>Does it solve your problem?</a:t>
+            </a:r>
+            <a:endParaRPr lang="en-US" dirty="0"/>
+          </a:p>
+        </p:txBody>
+      </p:sp>
+      <p:sp>
+        <p:nvSpPr>
+          <p:cNvPr id="3" name="Content Placeholder 2"/>
+          <p:cNvSpPr>
+            <a:spLocks noGrp="1"/>
+          </p:cNvSpPr>
+          <p:nvPr>
+            <p:ph idx="1"/>
+          </p:nvPr>
+        </p:nvSpPr>
+        <p:spPr>
+          <a:xfrm>
+            <a:off x="838200" y="2839891"/>
+            <a:ext cx="5181600" cy="3621869"/>
+          </a:xfrm>
+        </p:spPr>
+        <p:txBody>
+          <a:bodyPr>
+            <a:normAutofit/>
+          </a:bodyPr>
+          <a:lstStyle/>
+          <a:p>
+            <a:endParaRPr lang="en-US" dirty="0" smtClean="0"/>
+          </a:p>
+          <a:p>
+            <a:endParaRPr lang="en-US" dirty="0" smtClean="0"/>
+          </a:p>
+          <a:p>
             <a:r>
               <a:rPr lang="en-US" dirty="0" smtClean="0"/>
-              <a:t>Topology</a:t>
-            </a:r>
+              <a:t>Quicker feedback loop</a:t>
+            </a:r>
+          </a:p>
+          <a:p>
+            <a:endParaRPr lang="en-US" dirty="0" smtClean="0"/>
+          </a:p>
+          <a:p>
+            <a:r>
+              <a:rPr lang="en-US" dirty="0" smtClean="0"/>
+              <a:t>Real time trends</a:t>
+            </a:r>
+          </a:p>
+          <a:p>
+            <a:endParaRPr lang="en-US" dirty="0" smtClean="0"/>
+          </a:p>
+          <a:p>
+            <a:r>
+              <a:rPr lang="en-US" dirty="0" smtClean="0"/>
+              <a:t>Identify security issues</a:t>
+            </a:r>
+          </a:p>
+          <a:p>
+            <a:endParaRPr lang="en-US" dirty="0" smtClean="0"/>
+          </a:p>
+          <a:p>
             <a:endParaRPr lang="en-US" dirty="0"/>
           </a:p>
-        </p:txBody>
-      </p:sp>
-      <p:sp>
-        <p:nvSpPr>
-          <p:cNvPr id="6" name="TextBox 5"/>
+          <a:p>
+            <a:endParaRPr lang="en-US" dirty="0" smtClean="0"/>
+          </a:p>
+          <a:p>
+            <a:endParaRPr lang="en-US" dirty="0" smtClean="0"/>
+          </a:p>
+          <a:p>
+            <a:endParaRPr lang="en-US" dirty="0" smtClean="0"/>
+          </a:p>
+          <a:p>
+            <a:endParaRPr lang="en-US" dirty="0" smtClean="0"/>
+          </a:p>
+          <a:p>
+            <a:endParaRPr lang="en-US" dirty="0" smtClean="0"/>
+          </a:p>
+        </p:txBody>
+      </p:sp>
+      <p:sp>
+        <p:nvSpPr>
+          <p:cNvPr id="5" name="TextBox 4"/>
           <p:cNvSpPr txBox="1"/>
           <p:nvPr/>
         </p:nvSpPr>
         <p:spPr>
           <a:xfrm>
-            <a:off x="1127760" y="5943600"/>
-            <a:ext cx="7970520" cy="369332"/>
+            <a:off x="6217920" y="3855720"/>
+            <a:ext cx="5638800" cy="3108543"/>
           </a:xfrm>
           <a:prstGeom prst="rect">
             <a:avLst/>
@@ -3713,23 +3792,161 @@
           </a:bodyPr>
           <a:lstStyle/>
           <a:p>
-            <a:r>
-              <a:rPr lang="en-US" dirty="0" smtClean="0"/>
-              <a:t>Demo video attach here </a:t>
-            </a:r>
-            <a:endParaRPr lang="en-US" dirty="0"/>
+            <a:pPr marL="457200" indent="-457200">
+              <a:buFont typeface="Arial" charset="0"/>
+              <a:buChar char="•"/>
+            </a:pPr>
+            <a:r>
+              <a:rPr lang="en-US" sz="2800" spc="-150" dirty="0"/>
+              <a:t>I</a:t>
+            </a:r>
+            <a:r>
+              <a:rPr lang="en-US" sz="2800" dirty="0" smtClean="0"/>
+              <a:t>dentify </a:t>
+            </a:r>
+            <a:r>
+              <a:rPr lang="en-US" sz="2800" dirty="0"/>
+              <a:t>patterns over </a:t>
+            </a:r>
+            <a:r>
+              <a:rPr lang="en-US" sz="2800" dirty="0" smtClean="0"/>
+              <a:t>data </a:t>
+            </a:r>
+            <a:r>
+              <a:rPr lang="en-US" sz="2800" dirty="0"/>
+              <a:t>set</a:t>
+            </a:r>
+          </a:p>
+          <a:p>
+            <a:pPr marL="457200" indent="-457200">
+              <a:buFont typeface="Arial" charset="0"/>
+              <a:buChar char="•"/>
+            </a:pPr>
+            <a:endParaRPr lang="en-US" sz="2800" dirty="0" smtClean="0"/>
+          </a:p>
+          <a:p>
+            <a:pPr marL="457200" indent="-457200">
+              <a:buFont typeface="Arial" charset="0"/>
+              <a:buChar char="•"/>
+            </a:pPr>
+            <a:r>
+              <a:rPr lang="en-US" sz="2800" dirty="0" smtClean="0"/>
+              <a:t>Predictive analysis</a:t>
+            </a:r>
+          </a:p>
+          <a:p>
+            <a:pPr marL="457200" indent="-457200">
+              <a:buFont typeface="Arial" charset="0"/>
+              <a:buChar char="•"/>
+            </a:pPr>
+            <a:endParaRPr lang="en-US" sz="2800" dirty="0"/>
+          </a:p>
+          <a:p>
+            <a:pPr marL="457200" indent="-457200">
+              <a:buFont typeface="Arial" charset="0"/>
+              <a:buChar char="•"/>
+            </a:pPr>
+            <a:r>
+              <a:rPr lang="en-US" sz="2800" dirty="0" smtClean="0"/>
+              <a:t>Economic forecasting</a:t>
+            </a:r>
+          </a:p>
+          <a:p>
+            <a:pPr marL="457200" indent="-457200">
+              <a:buFont typeface="Arial" charset="0"/>
+              <a:buChar char="•"/>
+            </a:pPr>
+            <a:endParaRPr lang="en-US" sz="2800" dirty="0"/>
+          </a:p>
+          <a:p>
+            <a:pPr marL="457200" indent="-457200">
+              <a:buFont typeface="Arial" charset="0"/>
+              <a:buChar char="•"/>
+            </a:pPr>
+            <a:endParaRPr lang="en-US" sz="2800" dirty="0"/>
+          </a:p>
+        </p:txBody>
+      </p:sp>
+      <p:sp>
+        <p:nvSpPr>
+          <p:cNvPr id="6" name="TextBox 5"/>
+          <p:cNvSpPr txBox="1"/>
+          <p:nvPr/>
+        </p:nvSpPr>
+        <p:spPr>
+          <a:xfrm>
+            <a:off x="4953000" y="4034961"/>
+            <a:ext cx="1371600" cy="584775"/>
+          </a:xfrm>
+          <a:prstGeom prst="rect">
+            <a:avLst/>
+          </a:prstGeom>
+          <a:noFill/>
+          <a:ln>
+            <a:noFill/>
+          </a:ln>
+        </p:spPr>
+        <p:style>
+          <a:lnRef idx="2">
+            <a:schemeClr val="dk1"/>
+          </a:lnRef>
+          <a:fillRef idx="1">
+            <a:schemeClr val="lt1"/>
+          </a:fillRef>
+          <a:effectRef idx="0">
+            <a:schemeClr val="dk1"/>
+          </a:effectRef>
+          <a:fontRef idx="minor">
+            <a:schemeClr val="dk1"/>
+          </a:fontRef>
+        </p:style>
+        <p:txBody>
+          <a:bodyPr wrap="square" rtlCol="0">
+            <a:spAutoFit/>
+          </a:bodyPr>
+          <a:lstStyle/>
+          <a:p>
+            <a:r>
+              <a:rPr lang="en-US" sz="3200" dirty="0" smtClean="0"/>
+              <a:t>VS </a:t>
+            </a:r>
+            <a:endParaRPr lang="en-US" sz="3200" dirty="0"/>
+          </a:p>
+        </p:txBody>
+      </p:sp>
+      <p:sp>
+        <p:nvSpPr>
+          <p:cNvPr id="8" name="TextBox 7"/>
+          <p:cNvSpPr txBox="1"/>
+          <p:nvPr/>
+        </p:nvSpPr>
+        <p:spPr>
+          <a:xfrm>
+            <a:off x="6675120" y="3368040"/>
+            <a:ext cx="184731" cy="369332"/>
+          </a:xfrm>
+          <a:prstGeom prst="rect">
+            <a:avLst/>
+          </a:prstGeom>
+          <a:noFill/>
+        </p:spPr>
+        <p:txBody>
+          <a:bodyPr wrap="none" rtlCol="0">
+            <a:spAutoFit/>
+          </a:bodyPr>
+          <a:lstStyle/>
+          <a:p>
+            <a:endParaRPr lang="en-US"/>
           </a:p>
         </p:txBody>
       </p:sp>
       <p:pic>
         <p:nvPicPr>
-          <p:cNvPr id="8" name="Content Placeholder 7"/>
-          <p:cNvPicPr>
-            <a:picLocks noGrp="1" noChangeAspect="1"/>
+          <p:cNvPr id="7" name="Picture 6"/>
+          <p:cNvPicPr preferRelativeResize="0">
+            <a:picLocks/>
           </p:cNvPicPr>
-          <p:nvPr>
-            <p:ph idx="1"/>
-          </p:nvPr>
+          <p:nvPr/>
         </p:nvPicPr>
         <p:blipFill>
           <a:blip r:embed="rId2">
@@ -3745,15 +3962,18 @@
         </p:blipFill>
         <p:spPr>
           <a:xfrm>
-            <a:off x="1303645" y="1505585"/>
-            <a:ext cx="7359670" cy="4351338"/>
-          </a:xfrm>
+            <a:off x="7493000" y="808161"/>
+            <a:ext cx="3860800" cy="2559879"/>
+          </a:xfrm>
+          <a:prstGeom prst="rect">
+            <a:avLst/>
+          </a:prstGeom>
         </p:spPr>
       </p:pic>
     </p:spTree>
     <p:extLst>
       <p:ext uri="{BB962C8B-B14F-4D97-AF65-F5344CB8AC3E}">
-        <p14:creationId xmlns:p14="http://schemas.microsoft.com/office/powerpoint/2010/main" val="1354737996"/>
+        <p14:creationId xmlns:p14="http://schemas.microsoft.com/office/powerpoint/2010/main" val="1342718130"/>
       </p:ext>
     </p:extLst>
   </p:cSld>
@@ -3803,28 +4023,12 @@
           <a:lstStyle/>
           <a:p>
             <a:r>
-              <a:rPr lang="en-US" dirty="0" err="1" smtClean="0"/>
-              <a:t>KStream</a:t>
-            </a:r>
-            <a:r>
               <a:rPr lang="en-US" dirty="0" smtClean="0"/>
-              <a:t> (Insert) vs </a:t>
-            </a:r>
-            <a:r>
-              <a:rPr lang="en-US" dirty="0" err="1" smtClean="0"/>
-              <a:t>KTable</a:t>
+              <a:t>     Kafka </a:t>
             </a:r>
             <a:r>
               <a:rPr lang="en-US" dirty="0" smtClean="0"/>
-              <a:t> (</a:t>
-            </a:r>
-            <a:r>
-              <a:rPr lang="en-US" dirty="0" err="1" smtClean="0"/>
-              <a:t>Upsert</a:t>
-            </a:r>
-            <a:r>
-              <a:rPr lang="en-US" dirty="0" smtClean="0"/>
-              <a:t>)</a:t>
+              <a:t>and Kafka Streams </a:t>
             </a:r>
             <a:endParaRPr lang="en-US" dirty="0"/>
           </a:p>
@@ -3832,7 +4036,7 @@
       </p:sp>
       <p:pic>
         <p:nvPicPr>
-          <p:cNvPr id="6" name="Content Placeholder 5"/>
+          <p:cNvPr id="11" name="Content Placeholder 10"/>
           <p:cNvPicPr>
             <a:picLocks noGrp="1" noChangeAspect="1"/>
           </p:cNvPicPr>
@@ -3854,15 +4058,15 @@
         </p:blipFill>
         <p:spPr>
           <a:xfrm>
-            <a:off x="838200" y="1764603"/>
-            <a:ext cx="10256838" cy="4613716"/>
+            <a:off x="1519471" y="1337732"/>
+            <a:ext cx="7166567" cy="5164667"/>
           </a:xfrm>
         </p:spPr>
       </p:pic>
     </p:spTree>
     <p:extLst>
       <p:ext uri="{BB962C8B-B14F-4D97-AF65-F5344CB8AC3E}">
-        <p14:creationId xmlns:p14="http://schemas.microsoft.com/office/powerpoint/2010/main" val="875464812"/>
+        <p14:creationId xmlns:p14="http://schemas.microsoft.com/office/powerpoint/2010/main" val="1610514988"/>
       </p:ext>
     </p:extLst>
   </p:cSld>
@@ -3912,57 +4116,62 @@
           <a:lstStyle/>
           <a:p>
             <a:r>
+              <a:rPr lang="en-US" dirty="0" smtClean="0"/>
+              <a:t>Kafka Streams Concepts in brief</a:t>
+            </a:r>
+            <a:endParaRPr lang="en-US" dirty="0"/>
+          </a:p>
+        </p:txBody>
+      </p:sp>
+      <p:sp>
+        <p:nvSpPr>
+          <p:cNvPr id="3" name="Content Placeholder 2"/>
+          <p:cNvSpPr>
+            <a:spLocks noGrp="1"/>
+          </p:cNvSpPr>
+          <p:nvPr>
+            <p:ph idx="1"/>
+          </p:nvPr>
+        </p:nvSpPr>
+        <p:spPr/>
+        <p:txBody>
+          <a:bodyPr/>
+          <a:lstStyle/>
+          <a:p>
+            <a:r>
+              <a:rPr lang="en-US" dirty="0" smtClean="0"/>
+              <a:t>Streams DSL</a:t>
+            </a:r>
+          </a:p>
+          <a:p>
+            <a:r>
+              <a:rPr lang="en-US" dirty="0" err="1" smtClean="0"/>
+              <a:t>Kstreams</a:t>
+            </a:r>
+            <a:r>
+              <a:rPr lang="en-US" dirty="0" smtClean="0"/>
+              <a:t> &amp; </a:t>
+            </a:r>
+            <a:r>
+              <a:rPr lang="en-US" dirty="0" err="1" smtClean="0"/>
+              <a:t>Ktable</a:t>
+            </a:r>
+            <a:endParaRPr lang="en-US" dirty="0" smtClean="0"/>
+          </a:p>
+          <a:p>
+            <a:r>
+              <a:rPr lang="en-US" dirty="0" smtClean="0"/>
+              <a:t>Topology</a:t>
+            </a:r>
+          </a:p>
+          <a:p>
+            <a:r>
               <a:rPr lang="en-US" dirty="0" err="1" smtClean="0"/>
               <a:t>Stateful</a:t>
             </a:r>
             <a:r>
-              <a:rPr lang="en-US" dirty="0"/>
-              <a:t> </a:t>
-            </a:r>
-            <a:r>
               <a:rPr lang="en-US" dirty="0" smtClean="0"/>
-              <a:t>&amp; Stateless stream processing</a:t>
-            </a:r>
-            <a:endParaRPr lang="en-US" dirty="0"/>
-          </a:p>
-        </p:txBody>
-      </p:sp>
-      <p:sp>
-        <p:nvSpPr>
-          <p:cNvPr id="3" name="Content Placeholder 2"/>
-          <p:cNvSpPr>
-            <a:spLocks noGrp="1"/>
-          </p:cNvSpPr>
-          <p:nvPr>
-            <p:ph idx="1"/>
-          </p:nvPr>
-        </p:nvSpPr>
-        <p:spPr/>
-        <p:txBody>
-          <a:bodyPr/>
-          <a:lstStyle/>
-          <a:p>
-            <a:r>
-              <a:rPr lang="en-US" dirty="0" smtClean="0"/>
-              <a:t>Joining streams</a:t>
-            </a:r>
-          </a:p>
-          <a:p>
-            <a:r>
-              <a:rPr lang="en-US" dirty="0" err="1" smtClean="0"/>
-              <a:t>Kstreams</a:t>
-            </a:r>
-            <a:r>
-              <a:rPr lang="en-US" dirty="0" smtClean="0"/>
-              <a:t> and </a:t>
-            </a:r>
-            <a:r>
-              <a:rPr lang="en-US" dirty="0" err="1" smtClean="0"/>
-              <a:t>Ktable</a:t>
-            </a:r>
-            <a:r>
-              <a:rPr lang="en-US" dirty="0" smtClean="0"/>
-              <a:t> joining</a:t>
+              <a:t> and stateless stream processing</a:t>
             </a:r>
           </a:p>
           <a:p>
@@ -3973,28 +4182,27 @@
             <a:endParaRPr lang="en-US" dirty="0" smtClean="0"/>
           </a:p>
           <a:p>
-            <a:r>
-              <a:rPr lang="en-US" dirty="0" smtClean="0"/>
-              <a:t>Lightyear can process </a:t>
-            </a:r>
-            <a:r>
-              <a:rPr lang="en-US" dirty="0"/>
-              <a:t>400 million messages in under 4 hours.</a:t>
-            </a:r>
-            <a:endParaRPr lang="en-US" dirty="0" smtClean="0"/>
+            <a:endParaRPr lang="en-US" dirty="0"/>
           </a:p>
         </p:txBody>
       </p:sp>
     </p:spTree>
     <p:extLst>
       <p:ext uri="{BB962C8B-B14F-4D97-AF65-F5344CB8AC3E}">
-        <p14:creationId xmlns:p14="http://schemas.microsoft.com/office/powerpoint/2010/main" val="305983829"/>
+        <p14:creationId xmlns:p14="http://schemas.microsoft.com/office/powerpoint/2010/main" val="629079399"/>
       </p:ext>
     </p:extLst>
   </p:cSld>
   <p:clrMapOvr>
     <a:masterClrMapping/>
   </p:clrMapOvr>
+  <p:timing>
+    <p:tnLst>
+      <p:par>
+        <p:cTn id="1" dur="indefinite" restart="never" nodeType="tmRoot"/>
+      </p:par>
+    </p:tnLst>
+  </p:timing>
 </p:sld>
 </file>
 
@@ -4031,183 +4239,66 @@
           <a:lstStyle/>
           <a:p>
             <a:r>
+              <a:rPr lang="en-US" dirty="0" err="1" smtClean="0"/>
+              <a:t>KStream</a:t>
+            </a:r>
+            <a:r>
               <a:rPr lang="en-US" dirty="0" smtClean="0"/>
-              <a:t>References</a:t>
+              <a:t> (Insert) vs </a:t>
+            </a:r>
+            <a:r>
+              <a:rPr lang="en-US" dirty="0" err="1" smtClean="0"/>
+              <a:t>KTable</a:t>
+            </a:r>
+            <a:r>
+              <a:rPr lang="en-US" dirty="0" smtClean="0"/>
+              <a:t> (</a:t>
+            </a:r>
+            <a:r>
+              <a:rPr lang="en-US" dirty="0" err="1" smtClean="0"/>
+              <a:t>Upsert</a:t>
+            </a:r>
+            <a:r>
+              <a:rPr lang="en-US" dirty="0" smtClean="0"/>
+              <a:t>)</a:t>
             </a:r>
             <a:endParaRPr lang="en-US" dirty="0"/>
           </a:p>
         </p:txBody>
       </p:sp>
-      <p:sp>
-        <p:nvSpPr>
-          <p:cNvPr id="3" name="Content Placeholder 2"/>
-          <p:cNvSpPr>
-            <a:spLocks noGrp="1"/>
-          </p:cNvSpPr>
+      <p:pic>
+        <p:nvPicPr>
+          <p:cNvPr id="6" name="Content Placeholder 5"/>
+          <p:cNvPicPr>
+            <a:picLocks noGrp="1" noChangeAspect="1"/>
+          </p:cNvPicPr>
           <p:nvPr>
             <p:ph idx="1"/>
           </p:nvPr>
-        </p:nvSpPr>
-        <p:spPr>
-          <a:xfrm>
-            <a:off x="838200" y="1856105"/>
-            <a:ext cx="10515600" cy="4351338"/>
-          </a:xfrm>
-        </p:spPr>
-        <p:txBody>
-          <a:bodyPr/>
-          <a:lstStyle/>
-          <a:p>
-            <a:pPr marL="0" lvl="0" indent="0">
-              <a:lnSpc>
-                <a:spcPct val="100000"/>
-              </a:lnSpc>
-              <a:spcBef>
-                <a:spcPts val="0"/>
-              </a:spcBef>
-              <a:buNone/>
-              <a:defRPr/>
-            </a:pPr>
-            <a:r>
-              <a:rPr lang="en-US" dirty="0">
-                <a:hlinkClick r:id="rId2"/>
-              </a:rPr>
-              <a:t>https://</a:t>
-            </a:r>
-            <a:r>
-              <a:rPr lang="en-US" dirty="0" smtClean="0">
-                <a:hlinkClick r:id="rId2"/>
-              </a:rPr>
-              <a:t>www.oreilly.com/ideas/the-world-beyond-batch-streaming-101</a:t>
-            </a:r>
-            <a:endParaRPr lang="en-US" dirty="0" smtClean="0"/>
-          </a:p>
-          <a:p>
-            <a:pPr marL="0" lvl="0" indent="0">
-              <a:lnSpc>
-                <a:spcPct val="100000"/>
-              </a:lnSpc>
-              <a:spcBef>
-                <a:spcPts val="0"/>
-              </a:spcBef>
-              <a:buNone/>
-              <a:defRPr/>
-            </a:pPr>
-            <a:r>
-              <a:rPr lang="en-US" dirty="0" smtClean="0">
-                <a:hlinkClick r:id="rId3"/>
-              </a:rPr>
-              <a:t>https</a:t>
-            </a:r>
-            <a:r>
-              <a:rPr lang="en-US" dirty="0">
-                <a:hlinkClick r:id="rId3"/>
-              </a:rPr>
-              <a:t>://</a:t>
-            </a:r>
-            <a:r>
-              <a:rPr lang="en-US" dirty="0" smtClean="0">
-                <a:hlinkClick r:id="rId3"/>
-              </a:rPr>
-              <a:t>docs.confluent.io/current/streams/index.html</a:t>
-            </a:r>
-            <a:endParaRPr lang="en-US" dirty="0"/>
-          </a:p>
-          <a:p>
-            <a:pPr marL="0" lvl="0" indent="0">
-              <a:lnSpc>
-                <a:spcPct val="100000"/>
-              </a:lnSpc>
-              <a:spcBef>
-                <a:spcPts val="0"/>
-              </a:spcBef>
-              <a:buNone/>
-              <a:defRPr/>
-            </a:pPr>
-            <a:r>
-              <a:rPr lang="en-US" dirty="0">
-                <a:hlinkClick r:id="rId4"/>
-              </a:rPr>
-              <a:t>https://</a:t>
-            </a:r>
-            <a:r>
-              <a:rPr lang="en-US" dirty="0" smtClean="0">
-                <a:hlinkClick r:id="rId4"/>
-              </a:rPr>
-              <a:t>www.manning.com/books/kafka-streams-in-action</a:t>
-            </a:r>
-            <a:endParaRPr lang="en-US" dirty="0" smtClean="0"/>
-          </a:p>
-          <a:p>
-            <a:pPr marL="0" lvl="0" indent="0">
-              <a:lnSpc>
-                <a:spcPct val="100000"/>
-              </a:lnSpc>
-              <a:spcBef>
-                <a:spcPts val="0"/>
-              </a:spcBef>
-              <a:buNone/>
-              <a:defRPr/>
-            </a:pPr>
-            <a:r>
-              <a:rPr lang="en-US" dirty="0">
-                <a:hlinkClick r:id="rId5"/>
-              </a:rPr>
-              <a:t>https://</a:t>
-            </a:r>
-            <a:r>
-              <a:rPr lang="en-US" dirty="0" smtClean="0">
-                <a:hlinkClick r:id="rId5"/>
-              </a:rPr>
-              <a:t>www.oreilly.com/ideas/why-local-state-is-a-fundamental-primitive-in-stream-processing</a:t>
-            </a:r>
-            <a:endParaRPr lang="en-US" dirty="0" smtClean="0"/>
-          </a:p>
-          <a:p>
-            <a:pPr marL="0" lvl="0" indent="0">
-              <a:lnSpc>
-                <a:spcPct val="100000"/>
-              </a:lnSpc>
-              <a:spcBef>
-                <a:spcPts val="0"/>
-              </a:spcBef>
-              <a:buNone/>
-              <a:defRPr/>
-            </a:pPr>
-            <a:endParaRPr lang="en-US" dirty="0" smtClean="0"/>
-          </a:p>
-          <a:p>
-            <a:pPr marL="0" lvl="0" indent="0">
-              <a:lnSpc>
-                <a:spcPct val="100000"/>
-              </a:lnSpc>
-              <a:spcBef>
-                <a:spcPts val="0"/>
-              </a:spcBef>
-              <a:buNone/>
-              <a:defRPr/>
-            </a:pPr>
-            <a:endParaRPr lang="en-US" dirty="0"/>
-          </a:p>
-          <a:p>
-            <a:pPr marL="0" lvl="0" indent="0">
-              <a:lnSpc>
-                <a:spcPct val="100000"/>
-              </a:lnSpc>
-              <a:spcBef>
-                <a:spcPts val="0"/>
-              </a:spcBef>
-              <a:buNone/>
-              <a:defRPr/>
-            </a:pPr>
-            <a:endParaRPr lang="en-US" dirty="0"/>
-          </a:p>
-        </p:txBody>
-      </p:sp>
+        </p:nvPicPr>
+        <p:blipFill>
+          <a:blip r:embed="rId2">
+            <a:extLst>
+              <a:ext uri="{28A0092B-C50C-407E-A947-70E740481C1C}">
+                <a14:useLocalDpi xmlns:a14="http://schemas.microsoft.com/office/drawing/2010/main" val="0"/>
+              </a:ext>
+            </a:extLst>
+          </a:blip>
+          <a:stretch>
+            <a:fillRect/>
+          </a:stretch>
+        </p:blipFill>
+        <p:spPr>
+          <a:xfrm>
+            <a:off x="838200" y="1764603"/>
+            <a:ext cx="10256838" cy="4613716"/>
+          </a:xfrm>
+        </p:spPr>
+      </p:pic>
     </p:spTree>
     <p:extLst>
       <p:ext uri="{BB962C8B-B14F-4D97-AF65-F5344CB8AC3E}">
-        <p14:creationId xmlns:p14="http://schemas.microsoft.com/office/powerpoint/2010/main" val="65247757"/>
+        <p14:creationId xmlns:p14="http://schemas.microsoft.com/office/powerpoint/2010/main" val="875464812"/>
       </p:ext>
     </p:extLst>
   </p:cSld>
@@ -4253,56 +4344,633 @@
         </p:nvSpPr>
         <p:spPr>
           <a:xfrm>
+            <a:off x="838200" y="365126"/>
+            <a:ext cx="10515600" cy="786342"/>
+          </a:xfrm>
+        </p:spPr>
+        <p:txBody>
+          <a:bodyPr/>
+          <a:lstStyle/>
+          <a:p>
+            <a:r>
+              <a:rPr lang="en-US" dirty="0" smtClean="0"/>
+              <a:t>Demo masking PII Streams </a:t>
+            </a:r>
+            <a:r>
+              <a:rPr lang="en-US" dirty="0" smtClean="0"/>
+              <a:t>Topology</a:t>
+            </a:r>
+            <a:endParaRPr lang="en-US" dirty="0"/>
+          </a:p>
+        </p:txBody>
+      </p:sp>
+      <p:pic>
+        <p:nvPicPr>
+          <p:cNvPr id="5" name="Content Placeholder 4"/>
+          <p:cNvPicPr>
+            <a:picLocks noGrp="1" noChangeAspect="1"/>
+          </p:cNvPicPr>
+          <p:nvPr>
+            <p:ph idx="1"/>
+          </p:nvPr>
+        </p:nvPicPr>
+        <p:blipFill>
+          <a:blip r:embed="rId2">
+            <a:extLst>
+              <a:ext uri="{28A0092B-C50C-407E-A947-70E740481C1C}">
+                <a14:useLocalDpi xmlns:a14="http://schemas.microsoft.com/office/drawing/2010/main" val="0"/>
+              </a:ext>
+            </a:extLst>
+          </a:blip>
+          <a:stretch>
+            <a:fillRect/>
+          </a:stretch>
+        </p:blipFill>
+        <p:spPr>
+          <a:xfrm>
+            <a:off x="982133" y="1015929"/>
+            <a:ext cx="10298899" cy="5503403"/>
+          </a:xfrm>
+        </p:spPr>
+      </p:pic>
+    </p:spTree>
+    <p:extLst>
+      <p:ext uri="{BB962C8B-B14F-4D97-AF65-F5344CB8AC3E}">
+        <p14:creationId xmlns:p14="http://schemas.microsoft.com/office/powerpoint/2010/main" val="1354737996"/>
+      </p:ext>
+    </p:extLst>
+  </p:cSld>
+  <p:clrMapOvr>
+    <a:masterClrMapping/>
+  </p:clrMapOvr>
+  <p:timing>
+    <p:tnLst>
+      <p:par>
+        <p:cTn id="1" dur="indefinite" restart="never" nodeType="tmRoot"/>
+      </p:par>
+    </p:tnLst>
+  </p:timing>
+</p:sld>
+</file>
+
+<file path=ppt/slides/slide15.xml><?xml version="1.0" encoding="utf-8"?>
+<p:sld xmlns:a="http://schemas.openxmlformats.org/drawingml/2006/main" xmlns:r="http://schemas.openxmlformats.org/officeDocument/2006/relationships" xmlns:p="http://schemas.openxmlformats.org/presentationml/2006/main">
+  <p:cSld>
+    <p:spTree>
+      <p:nvGrpSpPr>
+        <p:cNvPr id="1" name=""/>
+        <p:cNvGrpSpPr/>
+        <p:nvPr/>
+      </p:nvGrpSpPr>
+      <p:grpSpPr>
+        <a:xfrm>
+          <a:off x="0" y="0"/>
+          <a:ext cx="0" cy="0"/>
+          <a:chOff x="0" y="0"/>
+          <a:chExt cx="0" cy="0"/>
+        </a:xfrm>
+      </p:grpSpPr>
+      <p:sp>
+        <p:nvSpPr>
+          <p:cNvPr id="2" name="Title 1"/>
+          <p:cNvSpPr>
+            <a:spLocks noGrp="1"/>
+          </p:cNvSpPr>
+          <p:nvPr>
+            <p:ph type="title"/>
+          </p:nvPr>
+        </p:nvSpPr>
+        <p:spPr/>
+        <p:txBody>
+          <a:bodyPr/>
+          <a:lstStyle/>
+          <a:p>
+            <a:r>
+              <a:rPr lang="en-US" dirty="0" smtClean="0"/>
+              <a:t> Start Demo</a:t>
+            </a:r>
+            <a:endParaRPr lang="en-US" dirty="0"/>
+          </a:p>
+        </p:txBody>
+      </p:sp>
+      <p:sp>
+        <p:nvSpPr>
+          <p:cNvPr id="3" name="Content Placeholder 2"/>
+          <p:cNvSpPr>
+            <a:spLocks noGrp="1"/>
+          </p:cNvSpPr>
+          <p:nvPr>
+            <p:ph idx="1"/>
+          </p:nvPr>
+        </p:nvSpPr>
+        <p:spPr/>
+        <p:txBody>
+          <a:bodyPr/>
+          <a:lstStyle/>
+          <a:p>
+            <a:endParaRPr lang="en-US" dirty="0"/>
+          </a:p>
+        </p:txBody>
+      </p:sp>
+    </p:spTree>
+    <p:extLst>
+      <p:ext uri="{BB962C8B-B14F-4D97-AF65-F5344CB8AC3E}">
+        <p14:creationId xmlns:p14="http://schemas.microsoft.com/office/powerpoint/2010/main" val="694037505"/>
+      </p:ext>
+    </p:extLst>
+  </p:cSld>
+  <p:clrMapOvr>
+    <a:masterClrMapping/>
+  </p:clrMapOvr>
+  <p:timing>
+    <p:tnLst>
+      <p:par>
+        <p:cTn id="1" dur="indefinite" restart="never" nodeType="tmRoot"/>
+      </p:par>
+    </p:tnLst>
+  </p:timing>
+</p:sld>
+</file>
+
+<file path=ppt/slides/slide16.xml><?xml version="1.0" encoding="utf-8"?>
+<p:sld xmlns:a="http://schemas.openxmlformats.org/drawingml/2006/main" xmlns:r="http://schemas.openxmlformats.org/officeDocument/2006/relationships" xmlns:p="http://schemas.openxmlformats.org/presentationml/2006/main">
+  <p:cSld>
+    <p:spTree>
+      <p:nvGrpSpPr>
+        <p:cNvPr id="1" name=""/>
+        <p:cNvGrpSpPr/>
+        <p:nvPr/>
+      </p:nvGrpSpPr>
+      <p:grpSpPr>
+        <a:xfrm>
+          <a:off x="0" y="0"/>
+          <a:ext cx="0" cy="0"/>
+          <a:chOff x="0" y="0"/>
+          <a:chExt cx="0" cy="0"/>
+        </a:xfrm>
+      </p:grpSpPr>
+      <p:sp>
+        <p:nvSpPr>
+          <p:cNvPr id="2" name="Title 1"/>
+          <p:cNvSpPr>
+            <a:spLocks noGrp="1"/>
+          </p:cNvSpPr>
+          <p:nvPr>
+            <p:ph type="title"/>
+          </p:nvPr>
+        </p:nvSpPr>
+        <p:spPr/>
+        <p:txBody>
+          <a:bodyPr/>
+          <a:lstStyle/>
+          <a:p>
+            <a:r>
+              <a:rPr lang="en-US" dirty="0" smtClean="0"/>
+              <a:t>Finish Demo</a:t>
+            </a:r>
+            <a:endParaRPr lang="en-US" dirty="0"/>
+          </a:p>
+        </p:txBody>
+      </p:sp>
+      <p:sp>
+        <p:nvSpPr>
+          <p:cNvPr id="3" name="Content Placeholder 2"/>
+          <p:cNvSpPr>
+            <a:spLocks noGrp="1"/>
+          </p:cNvSpPr>
+          <p:nvPr>
+            <p:ph idx="1"/>
+          </p:nvPr>
+        </p:nvSpPr>
+        <p:spPr/>
+        <p:txBody>
+          <a:bodyPr/>
+          <a:lstStyle/>
+          <a:p>
+            <a:endParaRPr lang="en-US"/>
+          </a:p>
+        </p:txBody>
+      </p:sp>
+    </p:spTree>
+    <p:extLst>
+      <p:ext uri="{BB962C8B-B14F-4D97-AF65-F5344CB8AC3E}">
+        <p14:creationId xmlns:p14="http://schemas.microsoft.com/office/powerpoint/2010/main" val="770756304"/>
+      </p:ext>
+    </p:extLst>
+  </p:cSld>
+  <p:clrMapOvr>
+    <a:masterClrMapping/>
+  </p:clrMapOvr>
+  <p:timing>
+    <p:tnLst>
+      <p:par>
+        <p:cTn id="1" dur="indefinite" restart="never" nodeType="tmRoot"/>
+      </p:par>
+    </p:tnLst>
+  </p:timing>
+</p:sld>
+</file>
+
+<file path=ppt/slides/slide17.xml><?xml version="1.0" encoding="utf-8"?>
+<p:sld xmlns:a="http://schemas.openxmlformats.org/drawingml/2006/main" xmlns:r="http://schemas.openxmlformats.org/officeDocument/2006/relationships" xmlns:p="http://schemas.openxmlformats.org/presentationml/2006/main">
+  <p:cSld>
+    <p:spTree>
+      <p:nvGrpSpPr>
+        <p:cNvPr id="1" name=""/>
+        <p:cNvGrpSpPr/>
+        <p:nvPr/>
+      </p:nvGrpSpPr>
+      <p:grpSpPr>
+        <a:xfrm>
+          <a:off x="0" y="0"/>
+          <a:ext cx="0" cy="0"/>
+          <a:chOff x="0" y="0"/>
+          <a:chExt cx="0" cy="0"/>
+        </a:xfrm>
+      </p:grpSpPr>
+      <p:sp>
+        <p:nvSpPr>
+          <p:cNvPr id="2" name="Title 1"/>
+          <p:cNvSpPr>
+            <a:spLocks noGrp="1"/>
+          </p:cNvSpPr>
+          <p:nvPr>
+            <p:ph type="title"/>
+          </p:nvPr>
+        </p:nvSpPr>
+        <p:spPr/>
+        <p:txBody>
+          <a:bodyPr/>
+          <a:lstStyle/>
+          <a:p>
+            <a:r>
+              <a:rPr lang="en-US" dirty="0" err="1" smtClean="0"/>
+              <a:t>Stateful</a:t>
+            </a:r>
+            <a:r>
+              <a:rPr lang="en-US" dirty="0"/>
+              <a:t> </a:t>
+            </a:r>
+            <a:r>
+              <a:rPr lang="en-US" dirty="0" smtClean="0"/>
+              <a:t>&amp; Stateless stream processing</a:t>
+            </a:r>
+            <a:endParaRPr lang="en-US" dirty="0"/>
+          </a:p>
+        </p:txBody>
+      </p:sp>
+      <p:sp>
+        <p:nvSpPr>
+          <p:cNvPr id="3" name="Content Placeholder 2"/>
+          <p:cNvSpPr>
+            <a:spLocks noGrp="1"/>
+          </p:cNvSpPr>
+          <p:nvPr>
+            <p:ph idx="1"/>
+          </p:nvPr>
+        </p:nvSpPr>
+        <p:spPr/>
+        <p:txBody>
+          <a:bodyPr/>
+          <a:lstStyle/>
+          <a:p>
+            <a:r>
+              <a:rPr lang="en-US" dirty="0" smtClean="0"/>
+              <a:t>Joining streams</a:t>
+            </a:r>
+          </a:p>
+          <a:p>
+            <a:r>
+              <a:rPr lang="en-US" dirty="0" smtClean="0"/>
+              <a:t>Lightyear </a:t>
+            </a:r>
+            <a:r>
+              <a:rPr lang="en-US" dirty="0" smtClean="0"/>
+              <a:t>can process </a:t>
+            </a:r>
+            <a:r>
+              <a:rPr lang="en-US" dirty="0"/>
+              <a:t>400 million messages in under 4 hours</a:t>
+            </a:r>
+            <a:r>
+              <a:rPr lang="en-US" dirty="0" smtClean="0"/>
+              <a:t>.</a:t>
+            </a:r>
+            <a:endParaRPr lang="en-US" dirty="0"/>
+          </a:p>
+          <a:p>
+            <a:r>
+              <a:rPr lang="en-US" dirty="0" smtClean="0"/>
+              <a:t>Size your instances appropriately</a:t>
+            </a:r>
+            <a:endParaRPr lang="en-US" dirty="0" smtClean="0"/>
+          </a:p>
+        </p:txBody>
+      </p:sp>
+    </p:spTree>
+    <p:extLst>
+      <p:ext uri="{BB962C8B-B14F-4D97-AF65-F5344CB8AC3E}">
+        <p14:creationId xmlns:p14="http://schemas.microsoft.com/office/powerpoint/2010/main" val="305983829"/>
+      </p:ext>
+    </p:extLst>
+  </p:cSld>
+  <p:clrMapOvr>
+    <a:masterClrMapping/>
+  </p:clrMapOvr>
+  <p:timing>
+    <p:tnLst>
+      <p:par>
+        <p:cTn id="1" dur="indefinite" restart="never" nodeType="tmRoot"/>
+      </p:par>
+    </p:tnLst>
+  </p:timing>
+</p:sld>
+</file>
+
+<file path=ppt/slides/slide18.xml><?xml version="1.0" encoding="utf-8"?>
+<p:sld xmlns:a="http://schemas.openxmlformats.org/drawingml/2006/main" xmlns:r="http://schemas.openxmlformats.org/officeDocument/2006/relationships" xmlns:p="http://schemas.openxmlformats.org/presentationml/2006/main">
+  <p:cSld>
+    <p:spTree>
+      <p:nvGrpSpPr>
+        <p:cNvPr id="1" name=""/>
+        <p:cNvGrpSpPr/>
+        <p:nvPr/>
+      </p:nvGrpSpPr>
+      <p:grpSpPr>
+        <a:xfrm>
+          <a:off x="0" y="0"/>
+          <a:ext cx="0" cy="0"/>
+          <a:chOff x="0" y="0"/>
+          <a:chExt cx="0" cy="0"/>
+        </a:xfrm>
+      </p:grpSpPr>
+      <p:sp>
+        <p:nvSpPr>
+          <p:cNvPr id="2" name="Title 1"/>
+          <p:cNvSpPr>
+            <a:spLocks noGrp="1"/>
+          </p:cNvSpPr>
+          <p:nvPr>
+            <p:ph type="title"/>
+          </p:nvPr>
+        </p:nvSpPr>
+        <p:spPr/>
+        <p:txBody>
+          <a:bodyPr/>
+          <a:lstStyle/>
+          <a:p>
+            <a:r>
+              <a:rPr lang="en-US" dirty="0" smtClean="0"/>
+              <a:t>References</a:t>
+            </a:r>
+            <a:endParaRPr lang="en-US" dirty="0"/>
+          </a:p>
+        </p:txBody>
+      </p:sp>
+      <p:sp>
+        <p:nvSpPr>
+          <p:cNvPr id="3" name="Content Placeholder 2"/>
+          <p:cNvSpPr>
+            <a:spLocks noGrp="1"/>
+          </p:cNvSpPr>
+          <p:nvPr>
+            <p:ph idx="1"/>
+          </p:nvPr>
+        </p:nvSpPr>
+        <p:spPr>
+          <a:xfrm>
+            <a:off x="838200" y="1856105"/>
+            <a:ext cx="10515600" cy="4351338"/>
+          </a:xfrm>
+        </p:spPr>
+        <p:txBody>
+          <a:bodyPr/>
+          <a:lstStyle/>
+          <a:p>
+            <a:pPr marL="0" lvl="0" indent="0">
+              <a:lnSpc>
+                <a:spcPct val="100000"/>
+              </a:lnSpc>
+              <a:spcBef>
+                <a:spcPts val="0"/>
+              </a:spcBef>
+              <a:buNone/>
+              <a:defRPr/>
+            </a:pPr>
+            <a:r>
+              <a:rPr lang="en-US" dirty="0">
+                <a:hlinkClick r:id="rId2"/>
+              </a:rPr>
+              <a:t>https://</a:t>
+            </a:r>
+            <a:r>
+              <a:rPr lang="en-US" dirty="0" smtClean="0">
+                <a:hlinkClick r:id="rId2"/>
+              </a:rPr>
+              <a:t>www.oreilly.com/ideas/the-world-beyond-batch-streaming-101</a:t>
+            </a:r>
+            <a:endParaRPr lang="en-US" dirty="0" smtClean="0"/>
+          </a:p>
+          <a:p>
+            <a:pPr marL="0" lvl="0" indent="0">
+              <a:lnSpc>
+                <a:spcPct val="100000"/>
+              </a:lnSpc>
+              <a:spcBef>
+                <a:spcPts val="0"/>
+              </a:spcBef>
+              <a:buNone/>
+              <a:defRPr/>
+            </a:pPr>
+            <a:r>
+              <a:rPr lang="en-US" dirty="0" smtClean="0">
+                <a:hlinkClick r:id="rId3"/>
+              </a:rPr>
+              <a:t>https</a:t>
+            </a:r>
+            <a:r>
+              <a:rPr lang="en-US" dirty="0">
+                <a:hlinkClick r:id="rId3"/>
+              </a:rPr>
+              <a:t>://</a:t>
+            </a:r>
+            <a:r>
+              <a:rPr lang="en-US" dirty="0" smtClean="0">
+                <a:hlinkClick r:id="rId3"/>
+              </a:rPr>
+              <a:t>docs.confluent.io/current/streams/index.html</a:t>
+            </a:r>
+            <a:endParaRPr lang="en-US" dirty="0"/>
+          </a:p>
+          <a:p>
+            <a:pPr marL="0" lvl="0" indent="0">
+              <a:lnSpc>
+                <a:spcPct val="100000"/>
+              </a:lnSpc>
+              <a:spcBef>
+                <a:spcPts val="0"/>
+              </a:spcBef>
+              <a:buNone/>
+              <a:defRPr/>
+            </a:pPr>
+            <a:r>
+              <a:rPr lang="en-US" dirty="0">
+                <a:hlinkClick r:id="rId4"/>
+              </a:rPr>
+              <a:t>https://</a:t>
+            </a:r>
+            <a:r>
+              <a:rPr lang="en-US" dirty="0" smtClean="0">
+                <a:hlinkClick r:id="rId4"/>
+              </a:rPr>
+              <a:t>www.manning.com/books/kafka-streams-in-action</a:t>
+            </a:r>
+            <a:endParaRPr lang="en-US" dirty="0" smtClean="0"/>
+          </a:p>
+          <a:p>
+            <a:pPr marL="0" lvl="0" indent="0">
+              <a:lnSpc>
+                <a:spcPct val="100000"/>
+              </a:lnSpc>
+              <a:spcBef>
+                <a:spcPts val="0"/>
+              </a:spcBef>
+              <a:buNone/>
+              <a:defRPr/>
+            </a:pPr>
+            <a:r>
+              <a:rPr lang="en-US" dirty="0">
+                <a:hlinkClick r:id="rId5"/>
+              </a:rPr>
+              <a:t>https://</a:t>
+            </a:r>
+            <a:r>
+              <a:rPr lang="en-US" dirty="0" smtClean="0">
+                <a:hlinkClick r:id="rId5"/>
+              </a:rPr>
+              <a:t>www.oreilly.com/ideas/why-local-state-is-a-fundamental-primitive-in-stream-processing</a:t>
+            </a:r>
+            <a:endParaRPr lang="en-US" dirty="0" smtClean="0"/>
+          </a:p>
+          <a:p>
+            <a:pPr marL="0" lvl="0" indent="0">
+              <a:lnSpc>
+                <a:spcPct val="100000"/>
+              </a:lnSpc>
+              <a:spcBef>
+                <a:spcPts val="0"/>
+              </a:spcBef>
+              <a:buNone/>
+              <a:defRPr/>
+            </a:pPr>
+            <a:endParaRPr lang="en-US" dirty="0" smtClean="0"/>
+          </a:p>
+          <a:p>
+            <a:pPr marL="0" lvl="0" indent="0">
+              <a:lnSpc>
+                <a:spcPct val="100000"/>
+              </a:lnSpc>
+              <a:spcBef>
+                <a:spcPts val="0"/>
+              </a:spcBef>
+              <a:buNone/>
+              <a:defRPr/>
+            </a:pPr>
+            <a:endParaRPr lang="en-US" dirty="0"/>
+          </a:p>
+          <a:p>
+            <a:pPr marL="0" lvl="0" indent="0">
+              <a:lnSpc>
+                <a:spcPct val="100000"/>
+              </a:lnSpc>
+              <a:spcBef>
+                <a:spcPts val="0"/>
+              </a:spcBef>
+              <a:buNone/>
+              <a:defRPr/>
+            </a:pPr>
+            <a:endParaRPr lang="en-US" dirty="0"/>
+          </a:p>
+        </p:txBody>
+      </p:sp>
+    </p:spTree>
+    <p:extLst>
+      <p:ext uri="{BB962C8B-B14F-4D97-AF65-F5344CB8AC3E}">
+        <p14:creationId xmlns:p14="http://schemas.microsoft.com/office/powerpoint/2010/main" val="65247757"/>
+      </p:ext>
+    </p:extLst>
+  </p:cSld>
+  <p:clrMapOvr>
+    <a:masterClrMapping/>
+  </p:clrMapOvr>
+  <p:timing>
+    <p:tnLst>
+      <p:par>
+        <p:cTn id="1" dur="indefinite" restart="never" nodeType="tmRoot"/>
+      </p:par>
+    </p:tnLst>
+  </p:timing>
+</p:sld>
+</file>
+
+<file path=ppt/slides/slide19.xml><?xml version="1.0" encoding="utf-8"?>
+<p:sld xmlns:a="http://schemas.openxmlformats.org/drawingml/2006/main" xmlns:r="http://schemas.openxmlformats.org/officeDocument/2006/relationships" xmlns:p="http://schemas.openxmlformats.org/presentationml/2006/main">
+  <p:cSld>
+    <p:spTree>
+      <p:nvGrpSpPr>
+        <p:cNvPr id="1" name=""/>
+        <p:cNvGrpSpPr/>
+        <p:nvPr/>
+      </p:nvGrpSpPr>
+      <p:grpSpPr>
+        <a:xfrm>
+          <a:off x="0" y="0"/>
+          <a:ext cx="0" cy="0"/>
+          <a:chOff x="0" y="0"/>
+          <a:chExt cx="0" cy="0"/>
+        </a:xfrm>
+      </p:grpSpPr>
+      <p:sp>
+        <p:nvSpPr>
+          <p:cNvPr id="2" name="Title 1"/>
+          <p:cNvSpPr>
+            <a:spLocks noGrp="1"/>
+          </p:cNvSpPr>
+          <p:nvPr>
+            <p:ph type="title"/>
+          </p:nvPr>
+        </p:nvSpPr>
+        <p:spPr>
+          <a:xfrm>
             <a:off x="838200" y="365125"/>
             <a:ext cx="10515600" cy="2454275"/>
           </a:xfrm>
         </p:spPr>
         <p:txBody>
           <a:bodyPr>
-            <a:normAutofit fontScale="90000"/>
+            <a:normAutofit/>
           </a:bodyPr>
           <a:lstStyle/>
           <a:p>
             <a:r>
               <a:rPr lang="en-US" dirty="0" smtClean="0"/>
-              <a:t>Questions </a:t>
-            </a:r>
-            <a:br>
-              <a:rPr lang="en-US" dirty="0" smtClean="0"/>
-            </a:br>
-            <a:r>
-              <a:rPr lang="en-US" dirty="0" smtClean="0"/>
+              <a:t>	</a:t>
+            </a:r>
+            <a:r>
+              <a:rPr lang="en-US" sz="4800" dirty="0" smtClean="0"/>
+              <a:t>Questions</a:t>
+            </a:r>
+            <a:r>
+              <a:rPr lang="en-US" dirty="0"/>
               <a:t/>
-            </a:r>
-            <a:br>
-              <a:rPr lang="en-US" dirty="0" smtClean="0"/>
-            </a:br>
-            <a:r>
-              <a:rPr lang="en-US" dirty="0" smtClean="0"/>
-              <a:t>Demo </a:t>
-            </a:r>
-            <a:r>
-              <a:rPr lang="en-US" dirty="0"/>
-              <a:t>at https://</a:t>
-            </a:r>
-            <a:r>
-              <a:rPr lang="en-US" dirty="0" err="1"/>
-              <a:t>github.com</a:t>
-            </a:r>
-            <a:r>
-              <a:rPr lang="en-US" dirty="0"/>
-              <a:t>/binitakaushik18 </a:t>
             </a:r>
             <a:br>
               <a:rPr lang="en-US" dirty="0"/>
             </a:br>
             <a:r>
-              <a:rPr lang="en-US" dirty="0"/>
-              <a:t/>
-            </a:r>
-            <a:br>
-              <a:rPr lang="en-US" dirty="0"/>
-            </a:br>
+              <a:rPr lang="en-US" dirty="0" smtClean="0"/>
+              <a:t> </a:t>
+            </a:r>
             <a:endParaRPr lang="en-US" dirty="0"/>
           </a:p>
         </p:txBody>
@@ -4324,7 +4992,10 @@
           </a:bodyPr>
           <a:lstStyle/>
           <a:p>
-            <a:endParaRPr lang="en-US" sz="4000" dirty="0">
+            <a:endParaRPr lang="en-US" sz="4400" dirty="0" smtClean="0">
+              <a:solidFill>
+                <a:srgbClr val="002060"/>
+              </a:solidFill>
               <a:latin typeface="Apple Chancery" charset="0"/>
               <a:ea typeface="Apple Chancery" charset="0"/>
               <a:cs typeface="Apple Chancery" charset="0"/>
@@ -4335,7 +5006,7 @@
               <a:buNone/>
             </a:pPr>
             <a:r>
-              <a:rPr lang="en-US" sz="4400" smtClean="0">
+              <a:rPr lang="en-US" sz="4800" dirty="0" smtClean="0">
                 <a:solidFill>
                   <a:srgbClr val="002060"/>
                 </a:solidFill>
@@ -4343,10 +5014,10 @@
                 <a:ea typeface="Apple Chancery" charset="0"/>
                 <a:cs typeface="Apple Chancery" charset="0"/>
               </a:rPr>
-              <a:t>May </a:t>
-            </a:r>
-            <a:r>
-              <a:rPr lang="en-US" sz="4400" dirty="0" smtClean="0">
+              <a:t>	May </a:t>
+            </a:r>
+            <a:r>
+              <a:rPr lang="en-US" sz="4800" dirty="0">
                 <a:solidFill>
                   <a:srgbClr val="002060"/>
                 </a:solidFill>
@@ -4356,6 +5027,16 @@
               </a:rPr>
               <a:t>all your streams come true</a:t>
             </a:r>
+          </a:p>
+          <a:p>
+            <a:endParaRPr lang="en-US" sz="4400" dirty="0">
+              <a:solidFill>
+                <a:srgbClr val="002060"/>
+              </a:solidFill>
+              <a:latin typeface="Apple Chancery" charset="0"/>
+              <a:ea typeface="Apple Chancery" charset="0"/>
+              <a:cs typeface="Apple Chancery" charset="0"/>
+            </a:endParaRPr>
           </a:p>
           <a:p>
             <a:endParaRPr lang="en-US" sz="4400" dirty="0">
@@ -4391,7 +5072,7 @@
         </p:blipFill>
         <p:spPr>
           <a:xfrm>
-            <a:off x="3561080" y="3479800"/>
+            <a:off x="4086021" y="3598333"/>
             <a:ext cx="3289300" cy="2476500"/>
           </a:xfrm>
           <a:prstGeom prst="rect">
@@ -4723,7 +5404,7 @@
         <p:spPr>
           <a:xfrm>
             <a:off x="822960" y="1280160"/>
-            <a:ext cx="10515600" cy="4927283"/>
+            <a:ext cx="10515600" cy="5374640"/>
           </a:xfrm>
         </p:spPr>
         <p:txBody>
@@ -4772,6 +5453,43 @@
           </a:prstGeom>
         </p:spPr>
       </p:pic>
+      <p:sp>
+        <p:nvSpPr>
+          <p:cNvPr id="5" name="TextBox 4"/>
+          <p:cNvSpPr txBox="1"/>
+          <p:nvPr/>
+        </p:nvSpPr>
+        <p:spPr>
+          <a:xfrm>
+            <a:off x="3488267" y="6214533"/>
+            <a:ext cx="2027093" cy="646331"/>
+          </a:xfrm>
+          <a:prstGeom prst="rect">
+            <a:avLst/>
+          </a:prstGeom>
+          <a:noFill/>
+        </p:spPr>
+        <p:txBody>
+          <a:bodyPr wrap="none" rtlCol="0">
+            <a:spAutoFit/>
+          </a:bodyPr>
+          <a:lstStyle/>
+          <a:p>
+            <a:r>
+              <a:rPr lang="en-US" dirty="0"/>
+              <a:t>Image: Tyler </a:t>
+            </a:r>
+            <a:r>
+              <a:rPr lang="en-US" dirty="0" err="1"/>
+              <a:t>Akidau</a:t>
+            </a:r>
+            <a:endParaRPr lang="en-US" dirty="0"/>
+          </a:p>
+          <a:p>
+            <a:endParaRPr lang="en-US" dirty="0"/>
+          </a:p>
+        </p:txBody>
+      </p:sp>
     </p:spTree>
     <p:extLst>
       <p:ext uri="{BB962C8B-B14F-4D97-AF65-F5344CB8AC3E}">
@@ -4861,6 +5579,43 @@
           </a:xfrm>
         </p:spPr>
       </p:pic>
+      <p:sp>
+        <p:nvSpPr>
+          <p:cNvPr id="3" name="TextBox 2"/>
+          <p:cNvSpPr txBox="1"/>
+          <p:nvPr/>
+        </p:nvSpPr>
+        <p:spPr>
+          <a:xfrm>
+            <a:off x="4097867" y="5943600"/>
+            <a:ext cx="2027093" cy="646331"/>
+          </a:xfrm>
+          <a:prstGeom prst="rect">
+            <a:avLst/>
+          </a:prstGeom>
+          <a:noFill/>
+        </p:spPr>
+        <p:txBody>
+          <a:bodyPr wrap="none" rtlCol="0">
+            <a:spAutoFit/>
+          </a:bodyPr>
+          <a:lstStyle/>
+          <a:p>
+            <a:r>
+              <a:rPr lang="en-US" dirty="0"/>
+              <a:t>Image: Tyler </a:t>
+            </a:r>
+            <a:r>
+              <a:rPr lang="en-US" dirty="0" err="1"/>
+              <a:t>Akidau</a:t>
+            </a:r>
+            <a:endParaRPr lang="en-US" dirty="0"/>
+          </a:p>
+          <a:p>
+            <a:endParaRPr lang="en-US" dirty="0"/>
+          </a:p>
+        </p:txBody>
+      </p:sp>
     </p:spTree>
     <p:extLst>
       <p:ext uri="{BB962C8B-B14F-4D97-AF65-F5344CB8AC3E}">
@@ -4884,6 +5639,19 @@
 <file path=ppt/slides/slide6.xml><?xml version="1.0" encoding="utf-8"?>
 <p:sld xmlns:a="http://schemas.openxmlformats.org/drawingml/2006/main" xmlns:r="http://schemas.openxmlformats.org/officeDocument/2006/relationships" xmlns:p="http://schemas.openxmlformats.org/presentationml/2006/main">
   <p:cSld>
+    <p:bg>
+      <p:bgPr>
+        <a:pattFill prst="pct5">
+          <a:fgClr>
+            <a:schemeClr val="accent1"/>
+          </a:fgClr>
+          <a:bgClr>
+            <a:schemeClr val="bg1"/>
+          </a:bgClr>
+        </a:pattFill>
+        <a:effectLst/>
+      </p:bgPr>
+    </p:bg>
     <p:spTree>
       <p:nvGrpSpPr>
         <p:cNvPr id="1" name=""/>
@@ -4908,7 +5676,12 @@
             <p:ph type="title"/>
           </p:nvPr>
         </p:nvSpPr>
-        <p:spPr/>
+        <p:spPr>
+          <a:xfrm>
+            <a:off x="838200" y="365126"/>
+            <a:ext cx="10515600" cy="1091142"/>
+          </a:xfrm>
+        </p:spPr>
         <p:txBody>
           <a:bodyPr/>
           <a:lstStyle/>
@@ -4931,7 +5704,12 @@
             <p:ph idx="1"/>
           </p:nvPr>
         </p:nvSpPr>
-        <p:spPr/>
+        <p:spPr>
+          <a:xfrm>
+            <a:off x="711200" y="1303867"/>
+            <a:ext cx="10642600" cy="4873096"/>
+          </a:xfrm>
+        </p:spPr>
         <p:txBody>
           <a:bodyPr/>
           <a:lstStyle/>
@@ -4950,8 +5728,14 @@
             </a:r>
             <a:r>
               <a:rPr lang="en-US" dirty="0"/>
-              <a:t>chopping it up along temporal boundaries into finite chunks for processing</a:t>
-            </a:r>
+              <a:t>chopping it up along temporal boundaries into finite chunks for </a:t>
+            </a:r>
+            <a:r>
+              <a:rPr lang="en-US" dirty="0" smtClean="0"/>
+              <a:t>processing</a:t>
+            </a:r>
+          </a:p>
+          <a:p>
             <a:endParaRPr lang="en-US" dirty="0" smtClean="0"/>
           </a:p>
           <a:p>
@@ -4964,7 +5748,10 @@
       </p:sp>
       <p:pic>
         <p:nvPicPr>
-          <p:cNvPr id="4" name="Picture 3"/>
+          <p:cNvPr id="4" name="Picture 3">
+            <a:hlinkClick r:id="" action="ppaction://noaction" highlightClick="1"/>
+            <a:hlinkHover r:id="" action="ppaction://noaction" highlightClick="1"/>
+          </p:cNvPr>
           <p:cNvPicPr>
             <a:picLocks noChangeAspect="1"/>
           </p:cNvPicPr>
@@ -4984,8 +5771,8 @@
         </p:blipFill>
         <p:spPr>
           <a:xfrm>
-            <a:off x="2191492" y="2821226"/>
-            <a:ext cx="7008031" cy="2986405"/>
+            <a:off x="961654" y="2149570"/>
+            <a:ext cx="10277155" cy="4137774"/>
           </a:xfrm>
           <a:prstGeom prst="rect">
             <a:avLst/>
@@ -5000,7 +5787,7 @@
         </p:nvSpPr>
         <p:spPr>
           <a:xfrm>
-            <a:off x="4686300" y="5897880"/>
+            <a:off x="4279902" y="6287344"/>
             <a:ext cx="2893641" cy="369332"/>
           </a:xfrm>
           <a:prstGeom prst="rect">
@@ -5073,14 +5860,19 @@
             <p:ph type="title"/>
           </p:nvPr>
         </p:nvSpPr>
-        <p:spPr/>
+        <p:spPr>
+          <a:xfrm>
+            <a:off x="838200" y="365126"/>
+            <a:ext cx="10515600" cy="1091142"/>
+          </a:xfrm>
+        </p:spPr>
         <p:txBody>
           <a:bodyPr/>
           <a:lstStyle/>
           <a:p>
             <a:r>
               <a:rPr lang="en-US" dirty="0" smtClean="0"/>
-              <a:t>Does it solve your problem?</a:t>
+              <a:t>Windowing in Streams</a:t>
             </a:r>
             <a:endParaRPr lang="en-US" dirty="0"/>
           </a:p>
@@ -5098,71 +5890,52 @@
         </p:nvSpPr>
         <p:spPr>
           <a:xfrm>
-            <a:off x="838200" y="2839891"/>
-            <a:ext cx="5181600" cy="3621869"/>
-          </a:xfrm>
-        </p:spPr>
-        <p:txBody>
-          <a:bodyPr>
-            <a:normAutofit/>
-          </a:bodyPr>
-          <a:lstStyle/>
+            <a:off x="711200" y="1303867"/>
+            <a:ext cx="10642600" cy="4873096"/>
+          </a:xfrm>
+        </p:spPr>
+        <p:txBody>
+          <a:bodyPr/>
+          <a:lstStyle/>
+          <a:p>
+            <a:r>
+              <a:rPr lang="en-US" dirty="0" smtClean="0"/>
+              <a:t>taking </a:t>
+            </a:r>
+            <a:r>
+              <a:rPr lang="en-US" dirty="0"/>
+              <a:t>a data source </a:t>
+            </a:r>
+            <a:r>
+              <a:rPr lang="en-US" dirty="0" smtClean="0"/>
+              <a:t>and </a:t>
+            </a:r>
+            <a:r>
+              <a:rPr lang="en-US" dirty="0"/>
+              <a:t>chopping it up along temporal boundaries into finite chunks for </a:t>
+            </a:r>
+            <a:r>
+              <a:rPr lang="en-US" dirty="0" smtClean="0"/>
+              <a:t>processing</a:t>
+            </a:r>
+          </a:p>
           <a:p>
             <a:endParaRPr lang="en-US" dirty="0" smtClean="0"/>
           </a:p>
           <a:p>
-            <a:endParaRPr lang="en-US" dirty="0" smtClean="0"/>
-          </a:p>
-          <a:p>
-            <a:r>
-              <a:rPr lang="en-US" dirty="0" smtClean="0"/>
-              <a:t>Quicker feedback loop</a:t>
-            </a:r>
-          </a:p>
-          <a:p>
-            <a:endParaRPr lang="en-US" dirty="0" smtClean="0"/>
-          </a:p>
-          <a:p>
-            <a:r>
-              <a:rPr lang="en-US" dirty="0" smtClean="0"/>
-              <a:t>Real time trends</a:t>
-            </a:r>
-          </a:p>
-          <a:p>
-            <a:endParaRPr lang="en-US" dirty="0" smtClean="0"/>
-          </a:p>
-          <a:p>
-            <a:r>
-              <a:rPr lang="en-US" dirty="0" smtClean="0"/>
-              <a:t>Identify security issues</a:t>
-            </a:r>
-          </a:p>
-          <a:p>
-            <a:endParaRPr lang="en-US" dirty="0" smtClean="0"/>
-          </a:p>
-          <a:p>
             <a:endParaRPr lang="en-US" dirty="0"/>
           </a:p>
           <a:p>
-            <a:endParaRPr lang="en-US" dirty="0" smtClean="0"/>
-          </a:p>
-          <a:p>
-            <a:endParaRPr lang="en-US" dirty="0" smtClean="0"/>
-          </a:p>
-          <a:p>
-            <a:endParaRPr lang="en-US" dirty="0" smtClean="0"/>
-          </a:p>
-          <a:p>
-            <a:endParaRPr lang="en-US" dirty="0" smtClean="0"/>
-          </a:p>
-          <a:p>
-            <a:endParaRPr lang="en-US" dirty="0" smtClean="0"/>
+            <a:endParaRPr lang="en-US" dirty="0"/>
           </a:p>
         </p:txBody>
       </p:sp>
       <p:pic>
         <p:nvPicPr>
-          <p:cNvPr id="4" name="Picture 3"/>
+          <p:cNvPr id="4" name="Picture 3">
+            <a:hlinkClick r:id="" action="ppaction://noaction" highlightClick="1"/>
+            <a:hlinkHover r:id="" action="ppaction://noaction" highlightClick="1"/>
+          </p:cNvPr>
           <p:cNvPicPr>
             <a:picLocks noChangeAspect="1"/>
           </p:cNvPicPr>
@@ -5170,6 +5943,7 @@
         </p:nvPicPr>
         <p:blipFill>
           <a:blip r:embed="rId2">
+            <a:alphaModFix amt="50000"/>
             <a:extLst>
               <a:ext uri="{28A0092B-C50C-407E-A947-70E740481C1C}">
                 <a14:useLocalDpi xmlns:a14="http://schemas.microsoft.com/office/drawing/2010/main" val="0"/>
@@ -5182,8 +5956,8 @@
         </p:blipFill>
         <p:spPr>
           <a:xfrm>
-            <a:off x="990600" y="1690434"/>
-            <a:ext cx="4811500" cy="1195324"/>
+            <a:off x="961654" y="2149570"/>
+            <a:ext cx="10277155" cy="4137774"/>
           </a:xfrm>
           <a:prstGeom prst="rect">
             <a:avLst/>
@@ -5192,14 +5966,14 @@
       </p:pic>
       <p:sp>
         <p:nvSpPr>
-          <p:cNvPr id="5" name="TextBox 4"/>
+          <p:cNvPr id="6" name="TextBox 5"/>
           <p:cNvSpPr txBox="1"/>
           <p:nvPr/>
         </p:nvSpPr>
         <p:spPr>
           <a:xfrm>
-            <a:off x="6217920" y="3855720"/>
-            <a:ext cx="5638800" cy="3108543"/>
+            <a:off x="4279902" y="6287344"/>
+            <a:ext cx="2893641" cy="369332"/>
           </a:xfrm>
           <a:prstGeom prst="rect">
             <a:avLst/>
@@ -5212,158 +5986,54 @@
           </a:bodyPr>
           <a:lstStyle/>
           <a:p>
-            <a:pPr marL="457200" indent="-457200">
-              <a:buFont typeface="Arial" charset="0"/>
-              <a:buChar char="•"/>
-            </a:pPr>
-            <a:r>
-              <a:rPr lang="en-US" sz="2800" spc="-150" dirty="0"/>
-              <a:t>I</a:t>
-            </a:r>
-            <a:r>
-              <a:rPr lang="en-US" sz="2800" dirty="0" smtClean="0"/>
-              <a:t>dentify </a:t>
-            </a:r>
-            <a:r>
-              <a:rPr lang="en-US" sz="2800" dirty="0"/>
-              <a:t>patterns over </a:t>
-            </a:r>
-            <a:r>
-              <a:rPr lang="en-US" sz="2800" dirty="0" smtClean="0"/>
-              <a:t>data </a:t>
-            </a:r>
-            <a:r>
-              <a:rPr lang="en-US" sz="2800" dirty="0"/>
-              <a:t>set</a:t>
-            </a:r>
-          </a:p>
-          <a:p>
-            <a:pPr marL="457200" indent="-457200">
-              <a:buFont typeface="Arial" charset="0"/>
-              <a:buChar char="•"/>
-            </a:pPr>
-            <a:endParaRPr lang="en-US" sz="2800" dirty="0" smtClean="0"/>
-          </a:p>
-          <a:p>
-            <a:pPr marL="457200" indent="-457200">
-              <a:buFont typeface="Arial" charset="0"/>
-              <a:buChar char="•"/>
-            </a:pPr>
-            <a:r>
-              <a:rPr lang="en-US" sz="2800" dirty="0" smtClean="0"/>
-              <a:t>Predictive analysis</a:t>
-            </a:r>
-          </a:p>
-          <a:p>
-            <a:pPr marL="457200" indent="-457200">
-              <a:buFont typeface="Arial" charset="0"/>
-              <a:buChar char="•"/>
-            </a:pPr>
-            <a:endParaRPr lang="en-US" sz="2800" dirty="0"/>
-          </a:p>
-          <a:p>
-            <a:pPr marL="457200" indent="-457200">
-              <a:buFont typeface="Arial" charset="0"/>
-              <a:buChar char="•"/>
-            </a:pPr>
-            <a:r>
-              <a:rPr lang="en-US" sz="2800" dirty="0" smtClean="0"/>
-              <a:t>Economic forecasting</a:t>
-            </a:r>
-          </a:p>
-          <a:p>
-            <a:pPr marL="457200" indent="-457200">
-              <a:buFont typeface="Arial" charset="0"/>
-              <a:buChar char="•"/>
-            </a:pPr>
-            <a:endParaRPr lang="en-US" sz="2800" dirty="0"/>
-          </a:p>
-          <a:p>
-            <a:pPr marL="457200" indent="-457200">
-              <a:buFont typeface="Arial" charset="0"/>
-              <a:buChar char="•"/>
-            </a:pPr>
-            <a:endParaRPr lang="en-US" sz="2800" dirty="0"/>
-          </a:p>
-        </p:txBody>
-      </p:sp>
-      <p:sp>
-        <p:nvSpPr>
-          <p:cNvPr id="6" name="TextBox 5"/>
-          <p:cNvSpPr txBox="1"/>
+            <a:r>
+              <a:rPr lang="en-US" dirty="0"/>
+              <a:t>Image: Tyler </a:t>
+            </a:r>
+            <a:r>
+              <a:rPr lang="en-US" dirty="0" err="1" smtClean="0"/>
+              <a:t>Akidau</a:t>
+            </a:r>
+            <a:endParaRPr lang="en-US" dirty="0"/>
+          </a:p>
+        </p:txBody>
+      </p:sp>
+      <p:pic>
+        <p:nvPicPr>
+          <p:cNvPr id="8" name="Picture 7">
+            <a:hlinkClick r:id="" action="ppaction://noaction" highlightClick="1"/>
+            <a:hlinkHover r:id="" action="ppaction://noaction" highlightClick="1"/>
+          </p:cNvPr>
+          <p:cNvPicPr>
+            <a:picLocks noChangeAspect="1"/>
+          </p:cNvPicPr>
           <p:nvPr/>
-        </p:nvSpPr>
-        <p:spPr>
-          <a:xfrm>
-            <a:off x="4953000" y="4034961"/>
-            <a:ext cx="1371600" cy="584775"/>
+        </p:nvPicPr>
+        <p:blipFill rotWithShape="1">
+          <a:blip r:embed="rId2">
+            <a:extLst>
+              <a:ext uri="{28A0092B-C50C-407E-A947-70E740481C1C}">
+                <a14:useLocalDpi xmlns:a14="http://schemas.microsoft.com/office/drawing/2010/main" val="0"/>
+              </a:ext>
+            </a:extLst>
+          </a:blip>
+          <a:srcRect l="1517" r="66353"/>
+          <a:stretch/>
+        </p:blipFill>
+        <p:spPr>
+          <a:xfrm>
+            <a:off x="977901" y="2149570"/>
+            <a:ext cx="3302001" cy="4137774"/>
           </a:xfrm>
           <a:prstGeom prst="rect">
             <a:avLst/>
           </a:prstGeom>
-          <a:noFill/>
-          <a:ln>
-            <a:noFill/>
-          </a:ln>
-        </p:spPr>
-        <p:style>
-          <a:lnRef idx="2">
-            <a:schemeClr val="dk1"/>
-          </a:lnRef>
-          <a:fillRef idx="1">
-            <a:schemeClr val="lt1"/>
-          </a:fillRef>
-          <a:effectRef idx="0">
-            <a:schemeClr val="dk1"/>
-          </a:effectRef>
-          <a:fontRef idx="minor">
-            <a:schemeClr val="dk1"/>
-          </a:fontRef>
-        </p:style>
-        <p:txBody>
-          <a:bodyPr wrap="square" rtlCol="0">
-            <a:spAutoFit/>
-          </a:bodyPr>
-          <a:lstStyle/>
-          <a:p>
-            <a:r>
-              <a:rPr lang="en-US" sz="3200" dirty="0" smtClean="0"/>
-              <a:t>VS </a:t>
-            </a:r>
-            <a:endParaRPr lang="en-US" sz="3200" dirty="0"/>
-          </a:p>
-        </p:txBody>
-      </p:sp>
-      <p:sp>
-        <p:nvSpPr>
-          <p:cNvPr id="8" name="TextBox 7"/>
-          <p:cNvSpPr txBox="1"/>
-          <p:nvPr/>
-        </p:nvSpPr>
-        <p:spPr>
-          <a:xfrm>
-            <a:off x="6675120" y="3368040"/>
-            <a:ext cx="184731" cy="369332"/>
-          </a:xfrm>
-          <a:prstGeom prst="rect">
-            <a:avLst/>
-          </a:prstGeom>
-          <a:noFill/>
-        </p:spPr>
-        <p:txBody>
-          <a:bodyPr wrap="none" rtlCol="0">
-            <a:spAutoFit/>
-          </a:bodyPr>
-          <a:lstStyle/>
-          <a:p>
-            <a:endParaRPr lang="en-US"/>
-          </a:p>
-        </p:txBody>
-      </p:sp>
+        </p:spPr>
+      </p:pic>
     </p:spTree>
     <p:extLst>
       <p:ext uri="{BB962C8B-B14F-4D97-AF65-F5344CB8AC3E}">
-        <p14:creationId xmlns:p14="http://schemas.microsoft.com/office/powerpoint/2010/main" val="1342718130"/>
+        <p14:creationId xmlns:p14="http://schemas.microsoft.com/office/powerpoint/2010/main" val="895456434"/>
       </p:ext>
     </p:extLst>
   </p:cSld>
@@ -5407,31 +6077,90 @@
             <p:ph type="title"/>
           </p:nvPr>
         </p:nvSpPr>
-        <p:spPr/>
+        <p:spPr>
+          <a:xfrm>
+            <a:off x="838200" y="365126"/>
+            <a:ext cx="10515600" cy="1091142"/>
+          </a:xfrm>
+        </p:spPr>
         <p:txBody>
           <a:bodyPr/>
           <a:lstStyle/>
           <a:p>
             <a:r>
               <a:rPr lang="en-US" dirty="0" smtClean="0"/>
-              <a:t>Kafka and Kafka Streams </a:t>
-            </a:r>
+              <a:t>Windowing in Streams</a:t>
+            </a:r>
+            <a:endParaRPr lang="en-US" dirty="0"/>
+          </a:p>
+        </p:txBody>
+      </p:sp>
+      <p:sp>
+        <p:nvSpPr>
+          <p:cNvPr id="3" name="Content Placeholder 2"/>
+          <p:cNvSpPr>
+            <a:spLocks noGrp="1"/>
+          </p:cNvSpPr>
+          <p:nvPr>
+            <p:ph idx="1"/>
+          </p:nvPr>
+        </p:nvSpPr>
+        <p:spPr>
+          <a:xfrm>
+            <a:off x="711200" y="1303867"/>
+            <a:ext cx="10642600" cy="4873096"/>
+          </a:xfrm>
+        </p:spPr>
+        <p:txBody>
+          <a:bodyPr/>
+          <a:lstStyle/>
+          <a:p>
+            <a:r>
+              <a:rPr lang="en-US" dirty="0" smtClean="0"/>
+              <a:t>taking </a:t>
+            </a:r>
+            <a:r>
+              <a:rPr lang="en-US" dirty="0"/>
+              <a:t>a data source </a:t>
+            </a:r>
+            <a:r>
+              <a:rPr lang="en-US" dirty="0" smtClean="0"/>
+              <a:t>and </a:t>
+            </a:r>
+            <a:r>
+              <a:rPr lang="en-US" dirty="0"/>
+              <a:t>chopping it up along temporal boundaries into finite chunks for </a:t>
+            </a:r>
+            <a:r>
+              <a:rPr lang="en-US" dirty="0" smtClean="0"/>
+              <a:t>processing</a:t>
+            </a:r>
+          </a:p>
+          <a:p>
+            <a:endParaRPr lang="en-US" dirty="0" smtClean="0"/>
+          </a:p>
+          <a:p>
+            <a:endParaRPr lang="en-US" dirty="0"/>
+          </a:p>
+          <a:p>
             <a:endParaRPr lang="en-US" dirty="0"/>
           </a:p>
         </p:txBody>
       </p:sp>
       <p:pic>
         <p:nvPicPr>
-          <p:cNvPr id="8" name="Content Placeholder 7"/>
+          <p:cNvPr id="4" name="Picture 3">
+            <a:hlinkClick r:id="" action="ppaction://noaction" highlightClick="1"/>
+            <a:hlinkHover r:id="" action="ppaction://noaction" highlightClick="1"/>
+          </p:cNvPr>
           <p:cNvPicPr>
-            <a:picLocks noGrp="1" noChangeAspect="1"/>
+            <a:picLocks noChangeAspect="1"/>
           </p:cNvPicPr>
-          <p:nvPr>
-            <p:ph idx="1"/>
-          </p:nvPr>
+          <p:nvPr/>
         </p:nvPicPr>
         <p:blipFill>
           <a:blip r:embed="rId2">
+            <a:alphaModFix amt="50000"/>
             <a:extLst>
               <a:ext uri="{28A0092B-C50C-407E-A947-70E740481C1C}">
                 <a14:useLocalDpi xmlns:a14="http://schemas.microsoft.com/office/drawing/2010/main" val="0"/>
@@ -5444,15 +6173,84 @@
         </p:blipFill>
         <p:spPr>
           <a:xfrm>
-            <a:off x="1698740" y="1306380"/>
-            <a:ext cx="7734820" cy="4748663"/>
-          </a:xfrm>
+            <a:off x="961654" y="2149570"/>
+            <a:ext cx="10277155" cy="4137774"/>
+          </a:xfrm>
+          <a:prstGeom prst="rect">
+            <a:avLst/>
+          </a:prstGeom>
+        </p:spPr>
+      </p:pic>
+      <p:sp>
+        <p:nvSpPr>
+          <p:cNvPr id="6" name="TextBox 5"/>
+          <p:cNvSpPr txBox="1"/>
+          <p:nvPr/>
+        </p:nvSpPr>
+        <p:spPr>
+          <a:xfrm>
+            <a:off x="4279902" y="6287344"/>
+            <a:ext cx="2893641" cy="369332"/>
+          </a:xfrm>
+          <a:prstGeom prst="rect">
+            <a:avLst/>
+          </a:prstGeom>
+          <a:noFill/>
+        </p:spPr>
+        <p:txBody>
+          <a:bodyPr wrap="square" rtlCol="0">
+            <a:spAutoFit/>
+          </a:bodyPr>
+          <a:lstStyle/>
+          <a:p>
+            <a:r>
+              <a:rPr lang="en-US" dirty="0"/>
+              <a:t>Image: Tyler </a:t>
+            </a:r>
+            <a:r>
+              <a:rPr lang="en-US" dirty="0" err="1" smtClean="0"/>
+              <a:t>Akidau</a:t>
+            </a:r>
+            <a:endParaRPr lang="en-US" dirty="0"/>
+          </a:p>
+        </p:txBody>
+      </p:sp>
+      <p:pic>
+        <p:nvPicPr>
+          <p:cNvPr id="7" name="Picture 6">
+            <a:hlinkClick r:id="" action="ppaction://noaction" highlightClick="1"/>
+            <a:hlinkHover r:id="" action="ppaction://noaction" highlightClick="1"/>
+          </p:cNvPr>
+          <p:cNvPicPr>
+            <a:picLocks noChangeAspect="1"/>
+          </p:cNvPicPr>
+          <p:nvPr/>
+        </p:nvPicPr>
+        <p:blipFill rotWithShape="1">
+          <a:blip r:embed="rId2">
+            <a:extLst>
+              <a:ext uri="{28A0092B-C50C-407E-A947-70E740481C1C}">
+                <a14:useLocalDpi xmlns:a14="http://schemas.microsoft.com/office/drawing/2010/main" val="0"/>
+              </a:ext>
+            </a:extLst>
+          </a:blip>
+          <a:srcRect l="32288" r="34223"/>
+          <a:stretch/>
+        </p:blipFill>
+        <p:spPr>
+          <a:xfrm>
+            <a:off x="4279903" y="2149570"/>
+            <a:ext cx="3441698" cy="4137774"/>
+          </a:xfrm>
+          <a:prstGeom prst="rect">
+            <a:avLst/>
+          </a:prstGeom>
         </p:spPr>
       </p:pic>
     </p:spTree>
     <p:extLst>
       <p:ext uri="{BB962C8B-B14F-4D97-AF65-F5344CB8AC3E}">
-        <p14:creationId xmlns:p14="http://schemas.microsoft.com/office/powerpoint/2010/main" val="1610514988"/>
+        <p14:creationId xmlns:p14="http://schemas.microsoft.com/office/powerpoint/2010/main" val="370888062"/>
       </p:ext>
     </p:extLst>
   </p:cSld>
@@ -5496,14 +6294,19 @@
             <p:ph type="title"/>
           </p:nvPr>
         </p:nvSpPr>
-        <p:spPr/>
+        <p:spPr>
+          <a:xfrm>
+            <a:off x="838200" y="365126"/>
+            <a:ext cx="10515600" cy="1091142"/>
+          </a:xfrm>
+        </p:spPr>
         <p:txBody>
           <a:bodyPr/>
           <a:lstStyle/>
           <a:p>
             <a:r>
               <a:rPr lang="en-US" dirty="0" smtClean="0"/>
-              <a:t>Kafka Streams Concepts in brief</a:t>
+              <a:t>Windowing in Streams</a:t>
             </a:r>
             <a:endParaRPr lang="en-US" dirty="0"/>
           </a:p>
@@ -5519,62 +6322,152 @@
             <p:ph idx="1"/>
           </p:nvPr>
         </p:nvSpPr>
-        <p:spPr/>
+        <p:spPr>
+          <a:xfrm>
+            <a:off x="711200" y="1303867"/>
+            <a:ext cx="10642600" cy="4873096"/>
+          </a:xfrm>
+        </p:spPr>
         <p:txBody>
           <a:bodyPr/>
           <a:lstStyle/>
           <a:p>
             <a:r>
               <a:rPr lang="en-US" dirty="0" smtClean="0"/>
-              <a:t>Streams DSL</a:t>
-            </a:r>
-          </a:p>
-          <a:p>
+              <a:t>taking </a:t>
+            </a:r>
+            <a:r>
+              <a:rPr lang="en-US" dirty="0"/>
+              <a:t>a data source </a:t>
+            </a:r>
+            <a:r>
+              <a:rPr lang="en-US" dirty="0" smtClean="0"/>
+              <a:t>and </a:t>
+            </a:r>
+            <a:r>
+              <a:rPr lang="en-US" dirty="0"/>
+              <a:t>chopping it up along temporal boundaries into finite chunks for </a:t>
+            </a:r>
+            <a:r>
+              <a:rPr lang="en-US" dirty="0" smtClean="0"/>
+              <a:t>processing</a:t>
+            </a:r>
+          </a:p>
+          <a:p>
+            <a:endParaRPr lang="en-US" dirty="0" smtClean="0"/>
+          </a:p>
+          <a:p>
+            <a:endParaRPr lang="en-US" dirty="0"/>
+          </a:p>
+          <a:p>
+            <a:endParaRPr lang="en-US" dirty="0"/>
+          </a:p>
+        </p:txBody>
+      </p:sp>
+      <p:pic>
+        <p:nvPicPr>
+          <p:cNvPr id="4" name="Picture 3">
+            <a:hlinkClick r:id="" action="ppaction://noaction" highlightClick="1"/>
+            <a:hlinkHover r:id="" action="ppaction://noaction" highlightClick="1"/>
+          </p:cNvPr>
+          <p:cNvPicPr>
+            <a:picLocks noChangeAspect="1"/>
+          </p:cNvPicPr>
+          <p:nvPr/>
+        </p:nvPicPr>
+        <p:blipFill>
+          <a:blip r:embed="rId2">
+            <a:alphaModFix amt="50000"/>
+            <a:extLst>
+              <a:ext uri="{28A0092B-C50C-407E-A947-70E740481C1C}">
+                <a14:useLocalDpi xmlns:a14="http://schemas.microsoft.com/office/drawing/2010/main" val="0"/>
+              </a:ext>
+            </a:extLst>
+          </a:blip>
+          <a:stretch>
+            <a:fillRect/>
+          </a:stretch>
+        </p:blipFill>
+        <p:spPr>
+          <a:xfrm>
+            <a:off x="961654" y="2149570"/>
+            <a:ext cx="10277155" cy="4137774"/>
+          </a:xfrm>
+          <a:prstGeom prst="rect">
+            <a:avLst/>
+          </a:prstGeom>
+        </p:spPr>
+      </p:pic>
+      <p:sp>
+        <p:nvSpPr>
+          <p:cNvPr id="6" name="TextBox 5"/>
+          <p:cNvSpPr txBox="1"/>
+          <p:nvPr/>
+        </p:nvSpPr>
+        <p:spPr>
+          <a:xfrm>
+            <a:off x="4279902" y="6287344"/>
+            <a:ext cx="2893641" cy="369332"/>
+          </a:xfrm>
+          <a:prstGeom prst="rect">
+            <a:avLst/>
+          </a:prstGeom>
+          <a:noFill/>
+        </p:spPr>
+        <p:txBody>
+          <a:bodyPr wrap="square" rtlCol="0">
+            <a:spAutoFit/>
+          </a:bodyPr>
+          <a:lstStyle/>
+          <a:p>
+            <a:r>
+              <a:rPr lang="en-US" dirty="0"/>
+              <a:t>Image: Tyler </a:t>
+            </a:r>
             <a:r>
               <a:rPr lang="en-US" dirty="0" err="1" smtClean="0"/>
-              <a:t>KStreams</a:t>
-            </a:r>
-            <a:endParaRPr lang="en-US" dirty="0" smtClean="0"/>
-          </a:p>
-          <a:p>
-            <a:r>
-              <a:rPr lang="en-US" dirty="0" err="1" smtClean="0"/>
-              <a:t>Ktable</a:t>
-            </a:r>
-            <a:endParaRPr lang="en-US" dirty="0" smtClean="0"/>
-          </a:p>
-          <a:p>
-            <a:r>
-              <a:rPr lang="en-US" dirty="0" smtClean="0"/>
-              <a:t>Topology</a:t>
-            </a:r>
-          </a:p>
-          <a:p>
-            <a:r>
-              <a:rPr lang="en-US" dirty="0" err="1" smtClean="0"/>
-              <a:t>Stateful</a:t>
-            </a:r>
-            <a:r>
-              <a:rPr lang="en-US" dirty="0" smtClean="0"/>
-              <a:t> and stateless stream processing</a:t>
-            </a:r>
-          </a:p>
-          <a:p>
-            <a:r>
-              <a:rPr lang="en-US" dirty="0" err="1" smtClean="0"/>
-              <a:t>RocksDB</a:t>
-            </a:r>
-            <a:endParaRPr lang="en-US" dirty="0" smtClean="0"/>
-          </a:p>
-          <a:p>
+              <a:t>Akidau</a:t>
+            </a:r>
             <a:endParaRPr lang="en-US" dirty="0"/>
           </a:p>
         </p:txBody>
       </p:sp>
+      <p:pic>
+        <p:nvPicPr>
+          <p:cNvPr id="7" name="Picture 6">
+            <a:hlinkClick r:id="" action="ppaction://noaction" highlightClick="1"/>
+            <a:hlinkHover r:id="" action="ppaction://noaction" highlightClick="1"/>
+          </p:cNvPr>
+          <p:cNvPicPr>
+            <a:picLocks noChangeAspect="1"/>
+          </p:cNvPicPr>
+          <p:nvPr/>
+        </p:nvPicPr>
+        <p:blipFill rotWithShape="1">
+          <a:blip r:embed="rId2">
+            <a:extLst>
+              <a:ext uri="{28A0092B-C50C-407E-A947-70E740481C1C}">
+                <a14:useLocalDpi xmlns:a14="http://schemas.microsoft.com/office/drawing/2010/main" val="0"/>
+              </a:ext>
+            </a:extLst>
+          </a:blip>
+          <a:srcRect l="64458"/>
+          <a:stretch/>
+        </p:blipFill>
+        <p:spPr>
+          <a:xfrm>
+            <a:off x="7586133" y="2149570"/>
+            <a:ext cx="3652676" cy="4137774"/>
+          </a:xfrm>
+          <a:prstGeom prst="rect">
+            <a:avLst/>
+          </a:prstGeom>
+        </p:spPr>
+      </p:pic>
     </p:spTree>
     <p:extLst>
       <p:ext uri="{BB962C8B-B14F-4D97-AF65-F5344CB8AC3E}">
-        <p14:creationId xmlns:p14="http://schemas.microsoft.com/office/powerpoint/2010/main" val="629079399"/>
+        <p14:creationId xmlns:p14="http://schemas.microsoft.com/office/powerpoint/2010/main" val="590357944"/>
       </p:ext>
     </p:extLst>
   </p:cSld>

</xml_diff>

<commit_message>
ppt changes and added comments
</commit_message>
<xml_diff>
--- a/doc/Kafka-Streams-TechConf [Autosaved].pptx
+++ b/doc/Kafka-Streams-TechConf [Autosaved].pptx
@@ -22,8 +22,8 @@
     <p:sldId id="266" r:id="rId13"/>
     <p:sldId id="267" r:id="rId14"/>
     <p:sldId id="270" r:id="rId15"/>
-    <p:sldId id="279" r:id="rId16"/>
-    <p:sldId id="280" r:id="rId17"/>
+    <p:sldId id="280" r:id="rId16"/>
+    <p:sldId id="285" r:id="rId17"/>
     <p:sldId id="278" r:id="rId18"/>
     <p:sldId id="274" r:id="rId19"/>
     <p:sldId id="277" r:id="rId20"/>
@@ -215,7 +215,7 @@
           <a:p>
             <a:fld id="{67B173D3-667C-A34A-B35B-B9CC34BF1288}" type="datetimeFigureOut">
               <a:rPr lang="en-US" smtClean="0"/>
-              <a:t>4/26/19</a:t>
+              <a:t>4/29/19</a:t>
             </a:fld>
             <a:endParaRPr lang="en-US"/>
           </a:p>
@@ -698,7 +698,7 @@
           <a:p>
             <a:fld id="{08A4A160-38F4-DF49-A329-14C2200A8F87}" type="datetimeFigureOut">
               <a:rPr lang="en-US" smtClean="0"/>
-              <a:t>4/26/19</a:t>
+              <a:t>4/29/19</a:t>
             </a:fld>
             <a:endParaRPr lang="en-US"/>
           </a:p>
@@ -868,7 +868,7 @@
           <a:p>
             <a:fld id="{08A4A160-38F4-DF49-A329-14C2200A8F87}" type="datetimeFigureOut">
               <a:rPr lang="en-US" smtClean="0"/>
-              <a:t>4/26/19</a:t>
+              <a:t>4/29/19</a:t>
             </a:fld>
             <a:endParaRPr lang="en-US"/>
           </a:p>
@@ -1048,7 +1048,7 @@
           <a:p>
             <a:fld id="{08A4A160-38F4-DF49-A329-14C2200A8F87}" type="datetimeFigureOut">
               <a:rPr lang="en-US" smtClean="0"/>
-              <a:t>4/26/19</a:t>
+              <a:t>4/29/19</a:t>
             </a:fld>
             <a:endParaRPr lang="en-US"/>
           </a:p>
@@ -1218,7 +1218,7 @@
           <a:p>
             <a:fld id="{08A4A160-38F4-DF49-A329-14C2200A8F87}" type="datetimeFigureOut">
               <a:rPr lang="en-US" smtClean="0"/>
-              <a:t>4/26/19</a:t>
+              <a:t>4/29/19</a:t>
             </a:fld>
             <a:endParaRPr lang="en-US"/>
           </a:p>
@@ -1464,7 +1464,7 @@
           <a:p>
             <a:fld id="{08A4A160-38F4-DF49-A329-14C2200A8F87}" type="datetimeFigureOut">
               <a:rPr lang="en-US" smtClean="0"/>
-              <a:t>4/26/19</a:t>
+              <a:t>4/29/19</a:t>
             </a:fld>
             <a:endParaRPr lang="en-US"/>
           </a:p>
@@ -1696,7 +1696,7 @@
           <a:p>
             <a:fld id="{08A4A160-38F4-DF49-A329-14C2200A8F87}" type="datetimeFigureOut">
               <a:rPr lang="en-US" smtClean="0"/>
-              <a:t>4/26/19</a:t>
+              <a:t>4/29/19</a:t>
             </a:fld>
             <a:endParaRPr lang="en-US"/>
           </a:p>
@@ -2063,7 +2063,7 @@
           <a:p>
             <a:fld id="{08A4A160-38F4-DF49-A329-14C2200A8F87}" type="datetimeFigureOut">
               <a:rPr lang="en-US" smtClean="0"/>
-              <a:t>4/26/19</a:t>
+              <a:t>4/29/19</a:t>
             </a:fld>
             <a:endParaRPr lang="en-US"/>
           </a:p>
@@ -2181,7 +2181,7 @@
           <a:p>
             <a:fld id="{08A4A160-38F4-DF49-A329-14C2200A8F87}" type="datetimeFigureOut">
               <a:rPr lang="en-US" smtClean="0"/>
-              <a:t>4/26/19</a:t>
+              <a:t>4/29/19</a:t>
             </a:fld>
             <a:endParaRPr lang="en-US"/>
           </a:p>
@@ -2276,7 +2276,7 @@
           <a:p>
             <a:fld id="{08A4A160-38F4-DF49-A329-14C2200A8F87}" type="datetimeFigureOut">
               <a:rPr lang="en-US" smtClean="0"/>
-              <a:t>4/26/19</a:t>
+              <a:t>4/29/19</a:t>
             </a:fld>
             <a:endParaRPr lang="en-US"/>
           </a:p>
@@ -2553,7 +2553,7 @@
           <a:p>
             <a:fld id="{08A4A160-38F4-DF49-A329-14C2200A8F87}" type="datetimeFigureOut">
               <a:rPr lang="en-US" smtClean="0"/>
-              <a:t>4/26/19</a:t>
+              <a:t>4/29/19</a:t>
             </a:fld>
             <a:endParaRPr lang="en-US"/>
           </a:p>
@@ -2806,7 +2806,7 @@
           <a:p>
             <a:fld id="{08A4A160-38F4-DF49-A329-14C2200A8F87}" type="datetimeFigureOut">
               <a:rPr lang="en-US" smtClean="0"/>
-              <a:t>4/26/19</a:t>
+              <a:t>4/29/19</a:t>
             </a:fld>
             <a:endParaRPr lang="en-US"/>
           </a:p>
@@ -3019,7 +3019,7 @@
           <a:p>
             <a:fld id="{08A4A160-38F4-DF49-A329-14C2200A8F87}" type="datetimeFigureOut">
               <a:rPr lang="en-US" smtClean="0"/>
-              <a:t>4/26/19</a:t>
+              <a:t>4/29/19</a:t>
             </a:fld>
             <a:endParaRPr lang="en-US"/>
           </a:p>
@@ -4023,8 +4023,12 @@
           <a:lstStyle/>
           <a:p>
             <a:r>
+              <a:rPr lang="en-US" dirty="0"/>
+              <a:t> </a:t>
+            </a:r>
+            <a:r>
               <a:rPr lang="en-US" dirty="0" smtClean="0"/>
-              <a:t>     Kafka </a:t>
+              <a:t>Kafka </a:t>
             </a:r>
             <a:r>
               <a:rPr lang="en-US" dirty="0" smtClean="0"/>
@@ -4144,9 +4148,12 @@
             </a:r>
           </a:p>
           <a:p>
+            <a:endParaRPr lang="en-US" dirty="0" smtClean="0"/>
+          </a:p>
+          <a:p>
             <a:r>
               <a:rPr lang="en-US" dirty="0" err="1" smtClean="0"/>
-              <a:t>Kstreams</a:t>
+              <a:t>KStreams</a:t>
             </a:r>
             <a:r>
               <a:rPr lang="en-US" dirty="0" smtClean="0"/>
@@ -4154,8 +4161,11 @@
             </a:r>
             <a:r>
               <a:rPr lang="en-US" dirty="0" err="1" smtClean="0"/>
-              <a:t>Ktable</a:t>
-            </a:r>
+              <a:t>KTable</a:t>
+            </a:r>
+            <a:endParaRPr lang="en-US" dirty="0" smtClean="0"/>
+          </a:p>
+          <a:p>
             <a:endParaRPr lang="en-US" dirty="0" smtClean="0"/>
           </a:p>
           <a:p>
@@ -4165,6 +4175,9 @@
             </a:r>
           </a:p>
           <a:p>
+            <a:endParaRPr lang="en-US" dirty="0" smtClean="0"/>
+          </a:p>
+          <a:p>
             <a:r>
               <a:rPr lang="en-US" dirty="0" err="1" smtClean="0"/>
               <a:t>Stateful</a:t>
@@ -4173,16 +4186,6 @@
               <a:rPr lang="en-US" dirty="0" smtClean="0"/>
               <a:t> and stateless stream processing</a:t>
             </a:r>
-          </a:p>
-          <a:p>
-            <a:r>
-              <a:rPr lang="en-US" dirty="0" err="1" smtClean="0"/>
-              <a:t>RocksDB</a:t>
-            </a:r>
-            <a:endParaRPr lang="en-US" dirty="0" smtClean="0"/>
-          </a:p>
-          <a:p>
-            <a:endParaRPr lang="en-US" dirty="0"/>
           </a:p>
         </p:txBody>
       </p:sp>
@@ -4354,11 +4357,7 @@
           <a:p>
             <a:r>
               <a:rPr lang="en-US" dirty="0" smtClean="0"/>
-              <a:t>Demo masking PII Streams </a:t>
-            </a:r>
-            <a:r>
-              <a:rPr lang="en-US" dirty="0" smtClean="0"/>
-              <a:t>Topology</a:t>
+              <a:t>Demo masking PII Streams Topology</a:t>
             </a:r>
             <a:endParaRPr lang="en-US" dirty="0"/>
           </a:p>
@@ -4447,7 +4446,7 @@
           <a:p>
             <a:r>
               <a:rPr lang="en-US" dirty="0" smtClean="0"/>
-              <a:t> Start Demo</a:t>
+              <a:t>Demo time </a:t>
             </a:r>
             <a:endParaRPr lang="en-US" dirty="0"/>
           </a:p>
@@ -4469,13 +4468,37 @@
           <a:lstStyle/>
           <a:p>
             <a:endParaRPr lang="en-US" dirty="0"/>
+          </a:p>
+          <a:p>
+            <a:endParaRPr lang="en-US" dirty="0" smtClean="0"/>
+          </a:p>
+          <a:p>
+            <a:endParaRPr lang="en-US" dirty="0"/>
+          </a:p>
+          <a:p>
+            <a:pPr marL="0" indent="0">
+              <a:buNone/>
+            </a:pPr>
+            <a:r>
+              <a:rPr lang="en-US" sz="4400" dirty="0" smtClean="0"/>
+              <a:t>Start </a:t>
+            </a:r>
+            <a:r>
+              <a:rPr lang="en-US" sz="4400" dirty="0" err="1"/>
+              <a:t>kafka</a:t>
+            </a:r>
+            <a:r>
+              <a:rPr lang="en-US" sz="4400" dirty="0"/>
+              <a:t>-streams-demo file</a:t>
+            </a:r>
+            <a:endParaRPr lang="en-US" sz="4400" dirty="0"/>
           </a:p>
         </p:txBody>
       </p:sp>
     </p:spTree>
     <p:extLst>
       <p:ext uri="{BB962C8B-B14F-4D97-AF65-F5344CB8AC3E}">
-        <p14:creationId xmlns:p14="http://schemas.microsoft.com/office/powerpoint/2010/main" val="694037505"/>
+        <p14:creationId xmlns:p14="http://schemas.microsoft.com/office/powerpoint/2010/main" val="770756304"/>
       </p:ext>
     </p:extLst>
   </p:cSld>
@@ -4526,7 +4549,7 @@
           <a:p>
             <a:r>
               <a:rPr lang="en-US" dirty="0" smtClean="0"/>
-              <a:t>Finish Demo</a:t>
+              <a:t> </a:t>
             </a:r>
             <a:endParaRPr lang="en-US" dirty="0"/>
           </a:p>
@@ -4547,14 +4570,34 @@
           <a:bodyPr/>
           <a:lstStyle/>
           <a:p>
-            <a:endParaRPr lang="en-US"/>
+            <a:endParaRPr lang="en-US" dirty="0" smtClean="0"/>
+          </a:p>
+          <a:p>
+            <a:endParaRPr lang="en-US" dirty="0"/>
+          </a:p>
+          <a:p>
+            <a:endParaRPr lang="en-US" dirty="0"/>
+          </a:p>
+          <a:p>
+            <a:pPr marL="0" indent="0">
+              <a:buNone/>
+            </a:pPr>
+            <a:r>
+              <a:rPr lang="en-US" sz="4800" dirty="0" smtClean="0"/>
+              <a:t>			Finish </a:t>
+            </a:r>
+            <a:r>
+              <a:rPr lang="en-US" sz="4800" dirty="0"/>
+              <a:t>Demo</a:t>
+            </a:r>
+            <a:endParaRPr lang="en-US" sz="4800" dirty="0"/>
           </a:p>
         </p:txBody>
       </p:sp>
     </p:spTree>
     <p:extLst>
       <p:ext uri="{BB962C8B-B14F-4D97-AF65-F5344CB8AC3E}">
-        <p14:creationId xmlns:p14="http://schemas.microsoft.com/office/powerpoint/2010/main" val="770756304"/>
+        <p14:creationId xmlns:p14="http://schemas.microsoft.com/office/powerpoint/2010/main" val="469243142"/>
       </p:ext>
     </p:extLst>
   </p:cSld>
@@ -4604,18 +4647,18 @@
           <a:lstStyle/>
           <a:p>
             <a:r>
-              <a:rPr lang="en-US" dirty="0" err="1" smtClean="0"/>
+              <a:rPr lang="en-US" u="sng" dirty="0" err="1" smtClean="0"/>
               <a:t>Stateful</a:t>
             </a:r>
             <a:r>
-              <a:rPr lang="en-US" dirty="0"/>
+              <a:rPr lang="en-US" u="sng" dirty="0"/>
               <a:t> </a:t>
             </a:r>
             <a:r>
-              <a:rPr lang="en-US" dirty="0" smtClean="0"/>
+              <a:rPr lang="en-US" u="sng" dirty="0" smtClean="0"/>
               <a:t>&amp; Stateless stream processing</a:t>
             </a:r>
-            <a:endParaRPr lang="en-US" dirty="0"/>
+            <a:endParaRPr lang="en-US" u="sng" dirty="0"/>
           </a:p>
         </p:txBody>
       </p:sp>
@@ -4633,6 +4676,9 @@
         <p:txBody>
           <a:bodyPr/>
           <a:lstStyle/>
+          <a:p>
+            <a:endParaRPr lang="en-US" dirty="0" smtClean="0"/>
+          </a:p>
           <a:p>
             <a:r>
               <a:rPr lang="en-US" dirty="0" smtClean="0"/>
@@ -4642,11 +4688,7 @@
           <a:p>
             <a:r>
               <a:rPr lang="en-US" dirty="0" smtClean="0"/>
-              <a:t>Lightyear </a:t>
-            </a:r>
-            <a:r>
-              <a:rPr lang="en-US" dirty="0" smtClean="0"/>
-              <a:t>can process </a:t>
+              <a:t>Lightyear can process </a:t>
             </a:r>
             <a:r>
               <a:rPr lang="en-US" dirty="0"/>
@@ -4663,7 +4705,6 @@
               <a:rPr lang="en-US" dirty="0" smtClean="0"/>
               <a:t>Size your instances appropriately</a:t>
             </a:r>
-            <a:endParaRPr lang="en-US" dirty="0" smtClean="0"/>
           </a:p>
         </p:txBody>
       </p:sp>
@@ -4953,10 +4994,6 @@
           <a:lstStyle/>
           <a:p>
             <a:r>
-              <a:rPr lang="en-US" dirty="0" smtClean="0"/>
-              <a:t>	</a:t>
-            </a:r>
-            <a:r>
               <a:rPr lang="en-US" sz="4800" dirty="0" smtClean="0"/>
               <a:t>Questions</a:t>
             </a:r>
@@ -5014,7 +5051,7 @@
                 <a:ea typeface="Apple Chancery" charset="0"/>
                 <a:cs typeface="Apple Chancery" charset="0"/>
               </a:rPr>
-              <a:t>	May </a:t>
+              <a:t>May </a:t>
             </a:r>
             <a:r>
               <a:rPr lang="en-US" sz="4800" dirty="0">

</xml_diff>